<commit_message>
SPI module implemented with FSM
</commit_message>
<xml_diff>
--- a/project.pptx
+++ b/project.pptx
@@ -8,12 +8,13 @@
     <p:sldId id="256" r:id="rId2"/>
     <p:sldId id="257" r:id="rId3"/>
     <p:sldId id="263" r:id="rId4"/>
-    <p:sldId id="262" r:id="rId5"/>
-    <p:sldId id="264" r:id="rId6"/>
-    <p:sldId id="258" r:id="rId7"/>
-    <p:sldId id="259" r:id="rId8"/>
-    <p:sldId id="260" r:id="rId9"/>
-    <p:sldId id="261" r:id="rId10"/>
+    <p:sldId id="265" r:id="rId5"/>
+    <p:sldId id="262" r:id="rId6"/>
+    <p:sldId id="264" r:id="rId7"/>
+    <p:sldId id="258" r:id="rId8"/>
+    <p:sldId id="259" r:id="rId9"/>
+    <p:sldId id="260" r:id="rId10"/>
+    <p:sldId id="261" r:id="rId11"/>
   </p:sldIdLst>
   <p:sldSz cx="12192000" cy="6858000"/>
   <p:notesSz cx="6858000" cy="9144000"/>
@@ -280,7 +281,7 @@
           <a:p>
             <a:fld id="{D1A5A9CC-028A-4668-9402-8AF1101129FF}" type="datetimeFigureOut">
               <a:rPr lang="it-IT" smtClean="0"/>
-              <a:t>02/02/2026</a:t>
+              <a:t>03/02/2026</a:t>
             </a:fld>
             <a:endParaRPr lang="it-IT"/>
           </a:p>
@@ -480,7 +481,7 @@
           <a:p>
             <a:fld id="{D1A5A9CC-028A-4668-9402-8AF1101129FF}" type="datetimeFigureOut">
               <a:rPr lang="it-IT" smtClean="0"/>
-              <a:t>02/02/2026</a:t>
+              <a:t>03/02/2026</a:t>
             </a:fld>
             <a:endParaRPr lang="it-IT"/>
           </a:p>
@@ -690,7 +691,7 @@
           <a:p>
             <a:fld id="{D1A5A9CC-028A-4668-9402-8AF1101129FF}" type="datetimeFigureOut">
               <a:rPr lang="it-IT" smtClean="0"/>
-              <a:t>02/02/2026</a:t>
+              <a:t>03/02/2026</a:t>
             </a:fld>
             <a:endParaRPr lang="it-IT"/>
           </a:p>
@@ -890,7 +891,7 @@
           <a:p>
             <a:fld id="{D1A5A9CC-028A-4668-9402-8AF1101129FF}" type="datetimeFigureOut">
               <a:rPr lang="it-IT" smtClean="0"/>
-              <a:t>02/02/2026</a:t>
+              <a:t>03/02/2026</a:t>
             </a:fld>
             <a:endParaRPr lang="it-IT"/>
           </a:p>
@@ -1166,7 +1167,7 @@
           <a:p>
             <a:fld id="{D1A5A9CC-028A-4668-9402-8AF1101129FF}" type="datetimeFigureOut">
               <a:rPr lang="it-IT" smtClean="0"/>
-              <a:t>02/02/2026</a:t>
+              <a:t>03/02/2026</a:t>
             </a:fld>
             <a:endParaRPr lang="it-IT"/>
           </a:p>
@@ -1434,7 +1435,7 @@
           <a:p>
             <a:fld id="{D1A5A9CC-028A-4668-9402-8AF1101129FF}" type="datetimeFigureOut">
               <a:rPr lang="it-IT" smtClean="0"/>
-              <a:t>02/02/2026</a:t>
+              <a:t>03/02/2026</a:t>
             </a:fld>
             <a:endParaRPr lang="it-IT"/>
           </a:p>
@@ -1849,7 +1850,7 @@
           <a:p>
             <a:fld id="{D1A5A9CC-028A-4668-9402-8AF1101129FF}" type="datetimeFigureOut">
               <a:rPr lang="it-IT" smtClean="0"/>
-              <a:t>02/02/2026</a:t>
+              <a:t>03/02/2026</a:t>
             </a:fld>
             <a:endParaRPr lang="it-IT"/>
           </a:p>
@@ -1991,7 +1992,7 @@
           <a:p>
             <a:fld id="{D1A5A9CC-028A-4668-9402-8AF1101129FF}" type="datetimeFigureOut">
               <a:rPr lang="it-IT" smtClean="0"/>
-              <a:t>02/02/2026</a:t>
+              <a:t>03/02/2026</a:t>
             </a:fld>
             <a:endParaRPr lang="it-IT"/>
           </a:p>
@@ -2104,7 +2105,7 @@
           <a:p>
             <a:fld id="{D1A5A9CC-028A-4668-9402-8AF1101129FF}" type="datetimeFigureOut">
               <a:rPr lang="it-IT" smtClean="0"/>
-              <a:t>02/02/2026</a:t>
+              <a:t>03/02/2026</a:t>
             </a:fld>
             <a:endParaRPr lang="it-IT"/>
           </a:p>
@@ -2417,7 +2418,7 @@
           <a:p>
             <a:fld id="{D1A5A9CC-028A-4668-9402-8AF1101129FF}" type="datetimeFigureOut">
               <a:rPr lang="it-IT" smtClean="0"/>
-              <a:t>02/02/2026</a:t>
+              <a:t>03/02/2026</a:t>
             </a:fld>
             <a:endParaRPr lang="it-IT"/>
           </a:p>
@@ -2706,7 +2707,7 @@
           <a:p>
             <a:fld id="{D1A5A9CC-028A-4668-9402-8AF1101129FF}" type="datetimeFigureOut">
               <a:rPr lang="it-IT" smtClean="0"/>
-              <a:t>02/02/2026</a:t>
+              <a:t>03/02/2026</a:t>
             </a:fld>
             <a:endParaRPr lang="it-IT"/>
           </a:p>
@@ -2949,7 +2950,7 @@
           <a:p>
             <a:fld id="{D1A5A9CC-028A-4668-9402-8AF1101129FF}" type="datetimeFigureOut">
               <a:rPr lang="it-IT" smtClean="0"/>
-              <a:t>02/02/2026</a:t>
+              <a:t>03/02/2026</a:t>
             </a:fld>
             <a:endParaRPr lang="it-IT"/>
           </a:p>
@@ -3453,6 +3454,413 @@
     <p:extLst>
       <p:ext uri="{BB962C8B-B14F-4D97-AF65-F5344CB8AC3E}">
         <p14:creationId xmlns:p14="http://schemas.microsoft.com/office/powerpoint/2010/main" val="3043255542"/>
+      </p:ext>
+    </p:extLst>
+  </p:cSld>
+  <p:clrMapOvr>
+    <a:masterClrMapping/>
+  </p:clrMapOvr>
+</p:sld>
+</file>
+
+<file path=ppt/slides/slide10.xml><?xml version="1.0" encoding="utf-8"?>
+<p:sld xmlns:a="http://schemas.openxmlformats.org/drawingml/2006/main" xmlns:r="http://schemas.openxmlformats.org/officeDocument/2006/relationships" xmlns:p="http://schemas.openxmlformats.org/presentationml/2006/main">
+  <p:cSld>
+    <p:spTree>
+      <p:nvGrpSpPr>
+        <p:cNvPr id="1" name=""/>
+        <p:cNvGrpSpPr/>
+        <p:nvPr/>
+      </p:nvGrpSpPr>
+      <p:grpSpPr>
+        <a:xfrm>
+          <a:off x="0" y="0"/>
+          <a:ext cx="0" cy="0"/>
+          <a:chOff x="0" y="0"/>
+          <a:chExt cx="0" cy="0"/>
+        </a:xfrm>
+      </p:grpSpPr>
+      <p:sp>
+        <p:nvSpPr>
+          <p:cNvPr id="15" name="Titolo 1">
+            <a:extLst>
+              <a:ext uri="{FF2B5EF4-FFF2-40B4-BE49-F238E27FC236}">
+                <a16:creationId xmlns:a16="http://schemas.microsoft.com/office/drawing/2014/main" id="{5B9FDF46-F64C-7738-29B8-278248568FD9}"/>
+              </a:ext>
+            </a:extLst>
+          </p:cNvPr>
+          <p:cNvSpPr>
+            <a:spLocks noGrp="1"/>
+          </p:cNvSpPr>
+          <p:nvPr>
+            <p:ph type="title"/>
+          </p:nvPr>
+        </p:nvSpPr>
+        <p:spPr>
+          <a:xfrm>
+            <a:off x="838200" y="365125"/>
+            <a:ext cx="10515600" cy="1325563"/>
+          </a:xfrm>
+        </p:spPr>
+        <p:txBody>
+          <a:bodyPr/>
+          <a:lstStyle/>
+          <a:p>
+            <a:r>
+              <a:rPr lang="en-US" dirty="0"/>
+              <a:t>Choice of depth</a:t>
+            </a:r>
+            <a:endParaRPr lang="it-IT" dirty="0"/>
+          </a:p>
+        </p:txBody>
+      </p:sp>
+      <p:sp>
+        <p:nvSpPr>
+          <p:cNvPr id="16" name="Segnaposto contenuto 2">
+            <a:extLst>
+              <a:ext uri="{FF2B5EF4-FFF2-40B4-BE49-F238E27FC236}">
+                <a16:creationId xmlns:a16="http://schemas.microsoft.com/office/drawing/2014/main" id="{0290625A-20EA-A4AB-D8E1-9E60CD02F9D1}"/>
+              </a:ext>
+            </a:extLst>
+          </p:cNvPr>
+          <p:cNvSpPr>
+            <a:spLocks noGrp="1"/>
+          </p:cNvSpPr>
+          <p:nvPr>
+            <p:ph idx="1"/>
+          </p:nvPr>
+        </p:nvSpPr>
+        <p:spPr>
+          <a:xfrm>
+            <a:off x="838200" y="1825625"/>
+            <a:ext cx="10515600" cy="4351338"/>
+          </a:xfrm>
+        </p:spPr>
+        <p:txBody>
+          <a:bodyPr>
+            <a:normAutofit/>
+          </a:bodyPr>
+          <a:lstStyle/>
+          <a:p>
+            <a:pPr marL="0" indent="0">
+              <a:buNone/>
+            </a:pPr>
+            <a:r>
+              <a:rPr lang="en-US" sz="2000" dirty="0"/>
+              <a:t>The choice of depth is a compromise between:</a:t>
+            </a:r>
+          </a:p>
+          <a:p>
+            <a:r>
+              <a:rPr lang="en-US" sz="2000" dirty="0"/>
+              <a:t>Maximum clock frequency: 100 MHz  -&gt; 1 bit 10ns -&gt; 10 bit 100ns </a:t>
+            </a:r>
+          </a:p>
+          <a:p>
+            <a:r>
+              <a:rPr lang="en-US" sz="2000" dirty="0"/>
+              <a:t>Expected average event frequency</a:t>
+            </a:r>
+          </a:p>
+          <a:p>
+            <a:r>
+              <a:rPr lang="en-US" sz="2000" dirty="0"/>
+              <a:t>Power</a:t>
+            </a:r>
+            <a:endParaRPr lang="it-IT" sz="2000" dirty="0"/>
+          </a:p>
+        </p:txBody>
+      </p:sp>
+      <mc:AlternateContent xmlns:mc="http://schemas.openxmlformats.org/markup-compatibility/2006" xmlns:a14="http://schemas.microsoft.com/office/drawing/2010/main">
+        <mc:Choice Requires="a14">
+          <p:sp>
+            <p:nvSpPr>
+              <p:cNvPr id="17" name="CasellaDiTesto 5">
+                <a:extLst>
+                  <a:ext uri="{FF2B5EF4-FFF2-40B4-BE49-F238E27FC236}">
+                    <a16:creationId xmlns:a16="http://schemas.microsoft.com/office/drawing/2014/main" id="{177978B0-04D7-AF43-C940-DA1DD187BF66}"/>
+                  </a:ext>
+                </a:extLst>
+              </p:cNvPr>
+              <p:cNvSpPr txBox="1"/>
+              <p:nvPr/>
+            </p:nvSpPr>
+            <p:spPr>
+              <a:xfrm>
+                <a:off x="5637276" y="2971800"/>
+                <a:ext cx="2656332" cy="369332"/>
+              </a:xfrm>
+              <a:prstGeom prst="rect">
+                <a:avLst/>
+              </a:prstGeom>
+              <a:noFill/>
+            </p:spPr>
+            <p:txBody>
+              <a:bodyPr wrap="square" rtlCol="0">
+                <a:spAutoFit/>
+              </a:bodyPr>
+              <a:lstStyle/>
+              <a:p>
+                <a:r>
+                  <a:rPr lang="it-IT" dirty="0"/>
+                  <a:t> </a:t>
+                </a:r>
+                <a14:m>
+                  <m:oMath xmlns:m="http://schemas.openxmlformats.org/officeDocument/2006/math">
+                    <m:r>
+                      <a:rPr lang="it-IT" b="0" i="0" smtClean="0">
+                        <a:latin typeface="Cambria Math" panose="02040503050406030204" pitchFamily="18" charset="0"/>
+                        <a:ea typeface="Cambria Math" panose="02040503050406030204" pitchFamily="18" charset="0"/>
+                      </a:rPr>
+                      <m:t>2,3 </m:t>
+                    </m:r>
+                    <m:r>
+                      <a:rPr lang="it-IT" i="1" smtClean="0">
+                        <a:latin typeface="Cambria Math" panose="02040503050406030204" pitchFamily="18" charset="0"/>
+                        <a:ea typeface="Cambria Math" panose="02040503050406030204" pitchFamily="18" charset="0"/>
+                      </a:rPr>
+                      <m:t>𝜇</m:t>
+                    </m:r>
+                    <m:r>
+                      <a:rPr lang="it-IT" b="0" i="1" smtClean="0">
+                        <a:latin typeface="Cambria Math" panose="02040503050406030204" pitchFamily="18" charset="0"/>
+                        <a:ea typeface="Cambria Math" panose="02040503050406030204" pitchFamily="18" charset="0"/>
+                      </a:rPr>
+                      <m:t>𝑠</m:t>
+                    </m:r>
+                    <m:r>
+                      <a:rPr lang="it-IT" b="0" i="1" smtClean="0">
+                        <a:latin typeface="Cambria Math" panose="02040503050406030204" pitchFamily="18" charset="0"/>
+                        <a:ea typeface="Cambria Math" panose="02040503050406030204" pitchFamily="18" charset="0"/>
+                      </a:rPr>
+                      <m:t>=2300 </m:t>
+                    </m:r>
+                    <m:r>
+                      <a:rPr lang="it-IT" b="0" i="1" smtClean="0">
+                        <a:latin typeface="Cambria Math" panose="02040503050406030204" pitchFamily="18" charset="0"/>
+                        <a:ea typeface="Cambria Math" panose="02040503050406030204" pitchFamily="18" charset="0"/>
+                      </a:rPr>
+                      <m:t>𝑛𝑠</m:t>
+                    </m:r>
+                    <m:r>
+                      <a:rPr lang="it-IT" b="0" i="1" smtClean="0">
+                        <a:latin typeface="Cambria Math" panose="02040503050406030204" pitchFamily="18" charset="0"/>
+                        <a:ea typeface="Cambria Math" panose="02040503050406030204" pitchFamily="18" charset="0"/>
+                      </a:rPr>
+                      <m:t> </m:t>
+                    </m:r>
+                  </m:oMath>
+                </a14:m>
+                <a:endParaRPr lang="it-IT" dirty="0"/>
+              </a:p>
+            </p:txBody>
+          </p:sp>
+        </mc:Choice>
+        <mc:Fallback xmlns="">
+          <p:sp>
+            <p:nvSpPr>
+              <p:cNvPr id="17" name="CasellaDiTesto 5">
+                <a:extLst>
+                  <a:ext uri="{FF2B5EF4-FFF2-40B4-BE49-F238E27FC236}">
+                    <a16:creationId xmlns:a16="http://schemas.microsoft.com/office/drawing/2014/main" id="{177978B0-04D7-AF43-C940-DA1DD187BF66}"/>
+                  </a:ext>
+                </a:extLst>
+              </p:cNvPr>
+              <p:cNvSpPr txBox="1">
+                <a:spLocks noRot="1" noChangeAspect="1" noMove="1" noResize="1" noEditPoints="1" noAdjustHandles="1" noChangeArrowheads="1" noChangeShapeType="1" noTextEdit="1"/>
+              </p:cNvSpPr>
+              <p:nvPr/>
+            </p:nvSpPr>
+            <p:spPr>
+              <a:xfrm>
+                <a:off x="5637276" y="2971800"/>
+                <a:ext cx="2656332" cy="369332"/>
+              </a:xfrm>
+              <a:prstGeom prst="rect">
+                <a:avLst/>
+              </a:prstGeom>
+              <a:blipFill>
+                <a:blip r:embed="rId2"/>
+                <a:stretch>
+                  <a:fillRect b="-3333"/>
+                </a:stretch>
+              </a:blipFill>
+            </p:spPr>
+            <p:txBody>
+              <a:bodyPr/>
+              <a:lstStyle/>
+              <a:p>
+                <a:r>
+                  <a:rPr lang="it-IT">
+                    <a:noFill/>
+                  </a:rPr>
+                  <a:t> </a:t>
+                </a:r>
+              </a:p>
+            </p:txBody>
+          </p:sp>
+        </mc:Fallback>
+      </mc:AlternateContent>
+      <p:sp>
+        <p:nvSpPr>
+          <p:cNvPr id="18" name="CasellaDiTesto 8">
+            <a:extLst>
+              <a:ext uri="{FF2B5EF4-FFF2-40B4-BE49-F238E27FC236}">
+                <a16:creationId xmlns:a16="http://schemas.microsoft.com/office/drawing/2014/main" id="{2F6F20CC-8EB1-B6EB-C915-82AC2F833D59}"/>
+              </a:ext>
+            </a:extLst>
+          </p:cNvPr>
+          <p:cNvSpPr txBox="1"/>
+          <p:nvPr/>
+        </p:nvSpPr>
+        <p:spPr>
+          <a:xfrm>
+            <a:off x="5568696" y="2582947"/>
+            <a:ext cx="3026791" cy="253916"/>
+          </a:xfrm>
+          <a:prstGeom prst="rect">
+            <a:avLst/>
+          </a:prstGeom>
+          <a:noFill/>
+        </p:spPr>
+        <p:txBody>
+          <a:bodyPr wrap="none" rtlCol="0">
+            <a:spAutoFit/>
+          </a:bodyPr>
+          <a:lstStyle/>
+          <a:p>
+            <a:r>
+              <a:rPr lang="it-IT" sz="1050" dirty="0"/>
+              <a:t>Per il</a:t>
+            </a:r>
+            <a:r>
+              <a:rPr lang="it-IT" sz="1000" dirty="0"/>
+              <a:t> reset </a:t>
+            </a:r>
+            <a:r>
+              <a:rPr lang="it-IT" sz="1050" dirty="0"/>
+              <a:t>metto10 bit a zero  in esadecimale 3FF</a:t>
+            </a:r>
+          </a:p>
+        </p:txBody>
+      </p:sp>
+      <p:pic>
+        <p:nvPicPr>
+          <p:cNvPr id="19" name="Immagine 18" descr="Immagine che contiene schermata, Software multimediale, software&#10;&#10;Il contenuto generato dall'IA potrebbe non essere corretto.">
+            <a:extLst>
+              <a:ext uri="{FF2B5EF4-FFF2-40B4-BE49-F238E27FC236}">
+                <a16:creationId xmlns:a16="http://schemas.microsoft.com/office/drawing/2014/main" id="{97019BEA-026F-3564-5F0E-AF1961CDB4D9}"/>
+              </a:ext>
+            </a:extLst>
+          </p:cNvPr>
+          <p:cNvPicPr>
+            <a:picLocks noChangeAspect="1"/>
+          </p:cNvPicPr>
+          <p:nvPr/>
+        </p:nvPicPr>
+        <p:blipFill>
+          <a:blip r:embed="rId3">
+            <a:extLst>
+              <a:ext uri="{28A0092B-C50C-407E-A947-70E740481C1C}">
+                <a14:useLocalDpi xmlns:a14="http://schemas.microsoft.com/office/drawing/2010/main" val="0"/>
+              </a:ext>
+            </a:extLst>
+          </a:blip>
+          <a:stretch>
+            <a:fillRect/>
+          </a:stretch>
+        </p:blipFill>
+        <p:spPr>
+          <a:xfrm>
+            <a:off x="551688" y="3476069"/>
+            <a:ext cx="9753600" cy="3152824"/>
+          </a:xfrm>
+          <a:prstGeom prst="rect">
+            <a:avLst/>
+          </a:prstGeom>
+        </p:spPr>
+      </p:pic>
+      <p:cxnSp>
+        <p:nvCxnSpPr>
+          <p:cNvPr id="20" name="Connettore diritto 19">
+            <a:extLst>
+              <a:ext uri="{FF2B5EF4-FFF2-40B4-BE49-F238E27FC236}">
+                <a16:creationId xmlns:a16="http://schemas.microsoft.com/office/drawing/2014/main" id="{E74BBBF4-043F-56B9-C2A7-87D55731BE36}"/>
+              </a:ext>
+            </a:extLst>
+          </p:cNvPr>
+          <p:cNvCxnSpPr>
+            <a:cxnSpLocks/>
+          </p:cNvCxnSpPr>
+          <p:nvPr/>
+        </p:nvCxnSpPr>
+        <p:spPr>
+          <a:xfrm>
+            <a:off x="3438607" y="4326280"/>
+            <a:ext cx="292608" cy="0"/>
+          </a:xfrm>
+          <a:prstGeom prst="line">
+            <a:avLst/>
+          </a:prstGeom>
+        </p:spPr>
+        <p:style>
+          <a:lnRef idx="2">
+            <a:schemeClr val="accent5"/>
+          </a:lnRef>
+          <a:fillRef idx="0">
+            <a:schemeClr val="accent5"/>
+          </a:fillRef>
+          <a:effectRef idx="1">
+            <a:schemeClr val="accent5"/>
+          </a:effectRef>
+          <a:fontRef idx="minor">
+            <a:schemeClr val="tx1"/>
+          </a:fontRef>
+        </p:style>
+      </p:cxnSp>
+      <p:sp>
+        <p:nvSpPr>
+          <p:cNvPr id="21" name="CasellaDiTesto 20">
+            <a:extLst>
+              <a:ext uri="{FF2B5EF4-FFF2-40B4-BE49-F238E27FC236}">
+                <a16:creationId xmlns:a16="http://schemas.microsoft.com/office/drawing/2014/main" id="{79188767-165B-D993-B6C9-C8317E85E542}"/>
+              </a:ext>
+            </a:extLst>
+          </p:cNvPr>
+          <p:cNvSpPr txBox="1"/>
+          <p:nvPr/>
+        </p:nvSpPr>
+        <p:spPr>
+          <a:xfrm>
+            <a:off x="3296641" y="4011606"/>
+            <a:ext cx="869149" cy="246221"/>
+          </a:xfrm>
+          <a:prstGeom prst="rect">
+            <a:avLst/>
+          </a:prstGeom>
+          <a:noFill/>
+        </p:spPr>
+        <p:txBody>
+          <a:bodyPr wrap="none" rtlCol="0">
+            <a:spAutoFit/>
+          </a:bodyPr>
+          <a:lstStyle/>
+          <a:p>
+            <a:r>
+              <a:rPr lang="it-IT" sz="1000" dirty="0">
+                <a:solidFill>
+                  <a:srgbClr val="FF0000"/>
+                </a:solidFill>
+              </a:rPr>
+              <a:t>2300+100ns</a:t>
+            </a:r>
+          </a:p>
+        </p:txBody>
+      </p:sp>
+    </p:spTree>
+    <p:extLst>
+      <p:ext uri="{BB962C8B-B14F-4D97-AF65-F5344CB8AC3E}">
+        <p14:creationId xmlns:p14="http://schemas.microsoft.com/office/powerpoint/2010/main" val="1329315143"/>
       </p:ext>
     </p:extLst>
   </p:cSld>
@@ -6870,7 +7278,7 @@
           <p:spPr>
             <a:xfrm>
               <a:off x="4071814" y="3548078"/>
-              <a:ext cx="583078" cy="461665"/>
+              <a:ext cx="583078" cy="276999"/>
             </a:xfrm>
             <a:prstGeom prst="rect">
               <a:avLst/>
@@ -6889,15 +7297,6 @@
                   <a:cs typeface="Helvetica" panose="020B0604020202020204" pitchFamily="34" charset="0"/>
                 </a:rPr>
                 <a:t>MISO</a:t>
-              </a:r>
-            </a:p>
-            <a:p>
-              <a:r>
-                <a:rPr lang="it-IT" sz="1200" dirty="0">
-                  <a:latin typeface="Helvetica" panose="020B0604020202020204" pitchFamily="34" charset="0"/>
-                  <a:cs typeface="Helvetica" panose="020B0604020202020204" pitchFamily="34" charset="0"/>
-                </a:rPr>
-                <a:t>start</a:t>
               </a:r>
             </a:p>
           </p:txBody>
@@ -7609,8 +8008,8 @@
         </p:blipFill>
         <p:spPr>
           <a:xfrm>
-            <a:off x="5568536" y="1834531"/>
-            <a:ext cx="6623464" cy="1691209"/>
+            <a:off x="4608765" y="1834531"/>
+            <a:ext cx="7583235" cy="1936273"/>
           </a:xfrm>
           <a:prstGeom prst="rect">
             <a:avLst/>
@@ -7735,107 +8134,22 @@
           </a:p>
         </p:txBody>
       </p:sp>
-      <p:cxnSp>
-        <p:nvCxnSpPr>
-          <p:cNvPr id="47" name="Straight Connector 46">
-            <a:extLst>
-              <a:ext uri="{FF2B5EF4-FFF2-40B4-BE49-F238E27FC236}">
-                <a16:creationId xmlns:a16="http://schemas.microsoft.com/office/drawing/2014/main" id="{2BF7857D-16FC-5E86-33D9-F289C98F97AA}"/>
-              </a:ext>
-            </a:extLst>
-          </p:cNvPr>
-          <p:cNvCxnSpPr>
-            <a:cxnSpLocks/>
-          </p:cNvCxnSpPr>
-          <p:nvPr/>
-        </p:nvCxnSpPr>
-        <p:spPr>
-          <a:xfrm flipH="1">
-            <a:off x="1429521" y="3354572"/>
-            <a:ext cx="692736" cy="1321110"/>
-          </a:xfrm>
-          <a:prstGeom prst="line">
-            <a:avLst/>
-          </a:prstGeom>
-        </p:spPr>
-        <p:style>
-          <a:lnRef idx="2">
-            <a:schemeClr val="dk1"/>
-          </a:lnRef>
-          <a:fillRef idx="0">
-            <a:schemeClr val="dk1"/>
-          </a:fillRef>
-          <a:effectRef idx="1">
-            <a:schemeClr val="dk1"/>
-          </a:effectRef>
-          <a:fontRef idx="minor">
-            <a:schemeClr val="tx1"/>
-          </a:fontRef>
-        </p:style>
-      </p:cxnSp>
       <p:sp>
         <p:nvSpPr>
-          <p:cNvPr id="51" name="Rectangle 50">
-            <a:extLst>
-              <a:ext uri="{FF2B5EF4-FFF2-40B4-BE49-F238E27FC236}">
-                <a16:creationId xmlns:a16="http://schemas.microsoft.com/office/drawing/2014/main" id="{802FD9C6-D465-5718-2FE4-D5B9FFB0E061}"/>
-              </a:ext>
-            </a:extLst>
-          </p:cNvPr>
-          <p:cNvSpPr/>
+          <p:cNvPr id="3" name="TextBox 2">
+            <a:extLst>
+              <a:ext uri="{FF2B5EF4-FFF2-40B4-BE49-F238E27FC236}">
+                <a16:creationId xmlns:a16="http://schemas.microsoft.com/office/drawing/2014/main" id="{D05827AA-3E32-90CB-95B5-2B80FD9852CF}"/>
+              </a:ext>
+            </a:extLst>
+          </p:cNvPr>
+          <p:cNvSpPr txBox="1"/>
           <p:nvPr/>
         </p:nvSpPr>
         <p:spPr>
           <a:xfrm>
-            <a:off x="1201479" y="4675682"/>
-            <a:ext cx="335007" cy="318976"/>
-          </a:xfrm>
-          <a:prstGeom prst="rect">
-            <a:avLst/>
-          </a:prstGeom>
-          <a:noFill/>
-        </p:spPr>
-        <p:style>
-          <a:lnRef idx="2">
-            <a:schemeClr val="accent1">
-              <a:shade val="15000"/>
-            </a:schemeClr>
-          </a:lnRef>
-          <a:fillRef idx="1">
-            <a:schemeClr val="accent1"/>
-          </a:fillRef>
-          <a:effectRef idx="0">
-            <a:schemeClr val="accent1"/>
-          </a:effectRef>
-          <a:fontRef idx="minor">
-            <a:schemeClr val="lt1"/>
-          </a:fontRef>
-        </p:style>
-        <p:txBody>
-          <a:bodyPr rtlCol="0" anchor="ctr"/>
-          <a:lstStyle/>
-          <a:p>
-            <a:pPr algn="ctr"/>
-            <a:endParaRPr lang="it-IT"/>
-          </a:p>
-        </p:txBody>
-      </p:sp>
-      <p:sp>
-        <p:nvSpPr>
-          <p:cNvPr id="52" name="TextBox 51">
-            <a:extLst>
-              <a:ext uri="{FF2B5EF4-FFF2-40B4-BE49-F238E27FC236}">
-                <a16:creationId xmlns:a16="http://schemas.microsoft.com/office/drawing/2014/main" id="{045D0E29-4EC5-4E71-643B-F92C191743F3}"/>
-              </a:ext>
-            </a:extLst>
-          </p:cNvPr>
-          <p:cNvSpPr txBox="1"/>
-          <p:nvPr/>
-        </p:nvSpPr>
-        <p:spPr>
-          <a:xfrm>
-            <a:off x="1526187" y="4604338"/>
-            <a:ext cx="612230" cy="461665"/>
+            <a:off x="6392985" y="1690688"/>
+            <a:ext cx="617415" cy="261610"/>
           </a:xfrm>
           <a:prstGeom prst="rect">
             <a:avLst/>
@@ -7849,12 +8163,100 @@
           <a:lstStyle/>
           <a:p>
             <a:r>
-              <a:rPr lang="it-IT" sz="1200" dirty="0">
-                <a:latin typeface="Helvetica" panose="020B0604020202020204" pitchFamily="34" charset="0"/>
-                <a:cs typeface="Helvetica" panose="020B0604020202020204" pitchFamily="34" charset="0"/>
-              </a:rPr>
-              <a:t>Slide switch</a:t>
-            </a:r>
+              <a:rPr lang="it-IT" sz="1100" dirty="0"/>
+              <a:t>25 ns</a:t>
+            </a:r>
+          </a:p>
+        </p:txBody>
+      </p:sp>
+      <p:sp>
+        <p:nvSpPr>
+          <p:cNvPr id="4" name="TextBox 3">
+            <a:extLst>
+              <a:ext uri="{FF2B5EF4-FFF2-40B4-BE49-F238E27FC236}">
+                <a16:creationId xmlns:a16="http://schemas.microsoft.com/office/drawing/2014/main" id="{BBA35050-9FAD-9FFD-6730-621BD091E7B8}"/>
+              </a:ext>
+            </a:extLst>
+          </p:cNvPr>
+          <p:cNvSpPr txBox="1"/>
+          <p:nvPr/>
+        </p:nvSpPr>
+        <p:spPr>
+          <a:xfrm>
+            <a:off x="6914489" y="1693048"/>
+            <a:ext cx="2460607" cy="261610"/>
+          </a:xfrm>
+          <a:prstGeom prst="rect">
+            <a:avLst/>
+          </a:prstGeom>
+          <a:noFill/>
+        </p:spPr>
+        <p:txBody>
+          <a:bodyPr wrap="square" rtlCol="0">
+            <a:spAutoFit/>
+          </a:bodyPr>
+          <a:lstStyle/>
+          <a:p>
+            <a:r>
+              <a:rPr lang="it-IT" sz="1100" dirty="0"/>
+              <a:t>25 ns =&gt;  </a:t>
+            </a:r>
+            <a:r>
+              <a:rPr lang="it-IT" sz="1100" dirty="0" err="1"/>
+              <a:t>Tsclk</a:t>
+            </a:r>
+            <a:r>
+              <a:rPr lang="it-IT" sz="1100" dirty="0"/>
+              <a:t> = 50 ns </a:t>
+            </a:r>
+            <a:r>
+              <a:rPr lang="it-IT" sz="1100" dirty="0" err="1"/>
+              <a:t>fsclk</a:t>
+            </a:r>
+            <a:r>
+              <a:rPr lang="it-IT" sz="1100" dirty="0"/>
+              <a:t> = 20 MHz</a:t>
+            </a:r>
+          </a:p>
+        </p:txBody>
+      </p:sp>
+      <p:sp>
+        <p:nvSpPr>
+          <p:cNvPr id="5" name="TextBox 4">
+            <a:extLst>
+              <a:ext uri="{FF2B5EF4-FFF2-40B4-BE49-F238E27FC236}">
+                <a16:creationId xmlns:a16="http://schemas.microsoft.com/office/drawing/2014/main" id="{8D15A27D-CAAA-1542-258B-41850A65224A}"/>
+              </a:ext>
+            </a:extLst>
+          </p:cNvPr>
+          <p:cNvSpPr txBox="1"/>
+          <p:nvPr/>
+        </p:nvSpPr>
+        <p:spPr>
+          <a:xfrm>
+            <a:off x="5630985" y="3912287"/>
+            <a:ext cx="617415" cy="600164"/>
+          </a:xfrm>
+          <a:prstGeom prst="rect">
+            <a:avLst/>
+          </a:prstGeom>
+          <a:noFill/>
+        </p:spPr>
+        <p:txBody>
+          <a:bodyPr wrap="square" rtlCol="0">
+            <a:spAutoFit/>
+          </a:bodyPr>
+          <a:lstStyle/>
+          <a:p>
+            <a:r>
+              <a:rPr lang="it-IT" sz="1100" dirty="0" err="1"/>
+              <a:t>convst</a:t>
+            </a:r>
+            <a:r>
+              <a:rPr lang="it-IT" sz="1100"/>
+              <a:t> T – 5 ns ??</a:t>
+            </a:r>
+            <a:endParaRPr lang="it-IT" sz="1100" dirty="0"/>
           </a:p>
         </p:txBody>
       </p:sp>
@@ -7888,6 +8290,550 @@
           <a:chExt cx="0" cy="0"/>
         </a:xfrm>
       </p:grpSpPr>
+      <p:sp>
+        <p:nvSpPr>
+          <p:cNvPr id="2" name="Title 1">
+            <a:extLst>
+              <a:ext uri="{FF2B5EF4-FFF2-40B4-BE49-F238E27FC236}">
+                <a16:creationId xmlns:a16="http://schemas.microsoft.com/office/drawing/2014/main" id="{001903EA-3DBB-3CD7-E0FB-46FDB0305019}"/>
+              </a:ext>
+            </a:extLst>
+          </p:cNvPr>
+          <p:cNvSpPr>
+            <a:spLocks noGrp="1"/>
+          </p:cNvSpPr>
+          <p:nvPr>
+            <p:ph type="title"/>
+          </p:nvPr>
+        </p:nvSpPr>
+        <p:spPr/>
+        <p:txBody>
+          <a:bodyPr/>
+          <a:lstStyle/>
+          <a:p>
+            <a:r>
+              <a:rPr lang="it-IT" dirty="0"/>
+              <a:t>SPI FSM</a:t>
+            </a:r>
+          </a:p>
+        </p:txBody>
+      </p:sp>
+      <p:sp>
+        <p:nvSpPr>
+          <p:cNvPr id="4" name="Oval 3">
+            <a:extLst>
+              <a:ext uri="{FF2B5EF4-FFF2-40B4-BE49-F238E27FC236}">
+                <a16:creationId xmlns:a16="http://schemas.microsoft.com/office/drawing/2014/main" id="{ED37811E-E453-4D44-EDB9-79D88BFABB2B}"/>
+              </a:ext>
+            </a:extLst>
+          </p:cNvPr>
+          <p:cNvSpPr/>
+          <p:nvPr/>
+        </p:nvSpPr>
+        <p:spPr>
+          <a:xfrm>
+            <a:off x="1703754" y="2930769"/>
+            <a:ext cx="1367692" cy="945662"/>
+          </a:xfrm>
+          <a:prstGeom prst="ellipse">
+            <a:avLst/>
+          </a:prstGeom>
+          <a:noFill/>
+        </p:spPr>
+        <p:style>
+          <a:lnRef idx="2">
+            <a:schemeClr val="accent1">
+              <a:shade val="15000"/>
+            </a:schemeClr>
+          </a:lnRef>
+          <a:fillRef idx="1">
+            <a:schemeClr val="accent1"/>
+          </a:fillRef>
+          <a:effectRef idx="0">
+            <a:schemeClr val="accent1"/>
+          </a:effectRef>
+          <a:fontRef idx="minor">
+            <a:schemeClr val="lt1"/>
+          </a:fontRef>
+        </p:style>
+        <p:txBody>
+          <a:bodyPr rtlCol="0" anchor="ctr"/>
+          <a:lstStyle/>
+          <a:p>
+            <a:pPr algn="ctr"/>
+            <a:endParaRPr lang="it-IT"/>
+          </a:p>
+        </p:txBody>
+      </p:sp>
+      <p:sp>
+        <p:nvSpPr>
+          <p:cNvPr id="5" name="TextBox 4">
+            <a:extLst>
+              <a:ext uri="{FF2B5EF4-FFF2-40B4-BE49-F238E27FC236}">
+                <a16:creationId xmlns:a16="http://schemas.microsoft.com/office/drawing/2014/main" id="{5A3D5A6B-0771-E94C-E5E1-D8B2683BE56F}"/>
+              </a:ext>
+            </a:extLst>
+          </p:cNvPr>
+          <p:cNvSpPr txBox="1"/>
+          <p:nvPr/>
+        </p:nvSpPr>
+        <p:spPr>
+          <a:xfrm>
+            <a:off x="2012461" y="3218934"/>
+            <a:ext cx="750277" cy="369332"/>
+          </a:xfrm>
+          <a:prstGeom prst="rect">
+            <a:avLst/>
+          </a:prstGeom>
+          <a:noFill/>
+        </p:spPr>
+        <p:txBody>
+          <a:bodyPr wrap="square" rtlCol="0">
+            <a:spAutoFit/>
+          </a:bodyPr>
+          <a:lstStyle/>
+          <a:p>
+            <a:r>
+              <a:rPr lang="it-IT" dirty="0"/>
+              <a:t>IDLE</a:t>
+            </a:r>
+          </a:p>
+        </p:txBody>
+      </p:sp>
+      <p:sp>
+        <p:nvSpPr>
+          <p:cNvPr id="6" name="Oval 5">
+            <a:extLst>
+              <a:ext uri="{FF2B5EF4-FFF2-40B4-BE49-F238E27FC236}">
+                <a16:creationId xmlns:a16="http://schemas.microsoft.com/office/drawing/2014/main" id="{FFCCB120-DF70-EC57-BE48-B43EF6A2CE62}"/>
+              </a:ext>
+            </a:extLst>
+          </p:cNvPr>
+          <p:cNvSpPr/>
+          <p:nvPr/>
+        </p:nvSpPr>
+        <p:spPr>
+          <a:xfrm>
+            <a:off x="5419969" y="1236892"/>
+            <a:ext cx="1586523" cy="945662"/>
+          </a:xfrm>
+          <a:prstGeom prst="ellipse">
+            <a:avLst/>
+          </a:prstGeom>
+          <a:noFill/>
+        </p:spPr>
+        <p:style>
+          <a:lnRef idx="2">
+            <a:schemeClr val="accent1">
+              <a:shade val="15000"/>
+            </a:schemeClr>
+          </a:lnRef>
+          <a:fillRef idx="1">
+            <a:schemeClr val="accent1"/>
+          </a:fillRef>
+          <a:effectRef idx="0">
+            <a:schemeClr val="accent1"/>
+          </a:effectRef>
+          <a:fontRef idx="minor">
+            <a:schemeClr val="lt1"/>
+          </a:fontRef>
+        </p:style>
+        <p:txBody>
+          <a:bodyPr rtlCol="0" anchor="ctr"/>
+          <a:lstStyle/>
+          <a:p>
+            <a:pPr algn="ctr"/>
+            <a:endParaRPr lang="it-IT"/>
+          </a:p>
+        </p:txBody>
+      </p:sp>
+      <p:sp>
+        <p:nvSpPr>
+          <p:cNvPr id="7" name="TextBox 6">
+            <a:extLst>
+              <a:ext uri="{FF2B5EF4-FFF2-40B4-BE49-F238E27FC236}">
+                <a16:creationId xmlns:a16="http://schemas.microsoft.com/office/drawing/2014/main" id="{5C351795-F4BA-83D2-EE40-FCF3DCD0CBB2}"/>
+              </a:ext>
+            </a:extLst>
+          </p:cNvPr>
+          <p:cNvSpPr txBox="1"/>
+          <p:nvPr/>
+        </p:nvSpPr>
+        <p:spPr>
+          <a:xfrm>
+            <a:off x="5419970" y="1525057"/>
+            <a:ext cx="1586523" cy="369332"/>
+          </a:xfrm>
+          <a:prstGeom prst="rect">
+            <a:avLst/>
+          </a:prstGeom>
+          <a:noFill/>
+        </p:spPr>
+        <p:txBody>
+          <a:bodyPr wrap="square" rtlCol="0">
+            <a:spAutoFit/>
+          </a:bodyPr>
+          <a:lstStyle/>
+          <a:p>
+            <a:r>
+              <a:rPr lang="it-IT" dirty="0"/>
+              <a:t>START_CONV</a:t>
+            </a:r>
+          </a:p>
+        </p:txBody>
+      </p:sp>
+      <p:sp>
+        <p:nvSpPr>
+          <p:cNvPr id="8" name="Oval 7">
+            <a:extLst>
+              <a:ext uri="{FF2B5EF4-FFF2-40B4-BE49-F238E27FC236}">
+                <a16:creationId xmlns:a16="http://schemas.microsoft.com/office/drawing/2014/main" id="{AABA5895-FAA5-1781-F2CF-EF0BE4338C29}"/>
+              </a:ext>
+            </a:extLst>
+          </p:cNvPr>
+          <p:cNvSpPr/>
+          <p:nvPr/>
+        </p:nvSpPr>
+        <p:spPr>
+          <a:xfrm>
+            <a:off x="9323754" y="2894087"/>
+            <a:ext cx="1586523" cy="945662"/>
+          </a:xfrm>
+          <a:prstGeom prst="ellipse">
+            <a:avLst/>
+          </a:prstGeom>
+          <a:noFill/>
+        </p:spPr>
+        <p:style>
+          <a:lnRef idx="2">
+            <a:schemeClr val="accent1">
+              <a:shade val="15000"/>
+            </a:schemeClr>
+          </a:lnRef>
+          <a:fillRef idx="1">
+            <a:schemeClr val="accent1"/>
+          </a:fillRef>
+          <a:effectRef idx="0">
+            <a:schemeClr val="accent1"/>
+          </a:effectRef>
+          <a:fontRef idx="minor">
+            <a:schemeClr val="lt1"/>
+          </a:fontRef>
+        </p:style>
+        <p:txBody>
+          <a:bodyPr rtlCol="0" anchor="ctr"/>
+          <a:lstStyle/>
+          <a:p>
+            <a:pPr algn="ctr"/>
+            <a:endParaRPr lang="it-IT"/>
+          </a:p>
+        </p:txBody>
+      </p:sp>
+      <p:sp>
+        <p:nvSpPr>
+          <p:cNvPr id="9" name="TextBox 8">
+            <a:extLst>
+              <a:ext uri="{FF2B5EF4-FFF2-40B4-BE49-F238E27FC236}">
+                <a16:creationId xmlns:a16="http://schemas.microsoft.com/office/drawing/2014/main" id="{2BBB7518-4407-4B8A-E34B-41855514C140}"/>
+              </a:ext>
+            </a:extLst>
+          </p:cNvPr>
+          <p:cNvSpPr txBox="1"/>
+          <p:nvPr/>
+        </p:nvSpPr>
+        <p:spPr>
+          <a:xfrm>
+            <a:off x="9440986" y="3043752"/>
+            <a:ext cx="1586523" cy="646331"/>
+          </a:xfrm>
+          <a:prstGeom prst="rect">
+            <a:avLst/>
+          </a:prstGeom>
+          <a:noFill/>
+        </p:spPr>
+        <p:txBody>
+          <a:bodyPr wrap="square" rtlCol="0">
+            <a:spAutoFit/>
+          </a:bodyPr>
+          <a:lstStyle/>
+          <a:p>
+            <a:r>
+              <a:rPr lang="it-IT" dirty="0"/>
+              <a:t>SPI TRANSFER</a:t>
+            </a:r>
+          </a:p>
+        </p:txBody>
+      </p:sp>
+      <p:sp>
+        <p:nvSpPr>
+          <p:cNvPr id="10" name="Oval 9">
+            <a:extLst>
+              <a:ext uri="{FF2B5EF4-FFF2-40B4-BE49-F238E27FC236}">
+                <a16:creationId xmlns:a16="http://schemas.microsoft.com/office/drawing/2014/main" id="{080BDAFE-4BCA-44E2-ED29-9CE6AA06C62C}"/>
+              </a:ext>
+            </a:extLst>
+          </p:cNvPr>
+          <p:cNvSpPr/>
+          <p:nvPr/>
+        </p:nvSpPr>
+        <p:spPr>
+          <a:xfrm>
+            <a:off x="4450862" y="4362607"/>
+            <a:ext cx="1586523" cy="945662"/>
+          </a:xfrm>
+          <a:prstGeom prst="ellipse">
+            <a:avLst/>
+          </a:prstGeom>
+          <a:noFill/>
+        </p:spPr>
+        <p:style>
+          <a:lnRef idx="2">
+            <a:schemeClr val="accent1">
+              <a:shade val="15000"/>
+            </a:schemeClr>
+          </a:lnRef>
+          <a:fillRef idx="1">
+            <a:schemeClr val="accent1"/>
+          </a:fillRef>
+          <a:effectRef idx="0">
+            <a:schemeClr val="accent1"/>
+          </a:effectRef>
+          <a:fontRef idx="minor">
+            <a:schemeClr val="lt1"/>
+          </a:fontRef>
+        </p:style>
+        <p:txBody>
+          <a:bodyPr rtlCol="0" anchor="ctr"/>
+          <a:lstStyle/>
+          <a:p>
+            <a:pPr algn="ctr"/>
+            <a:endParaRPr lang="it-IT"/>
+          </a:p>
+        </p:txBody>
+      </p:sp>
+      <p:sp>
+        <p:nvSpPr>
+          <p:cNvPr id="11" name="TextBox 10">
+            <a:extLst>
+              <a:ext uri="{FF2B5EF4-FFF2-40B4-BE49-F238E27FC236}">
+                <a16:creationId xmlns:a16="http://schemas.microsoft.com/office/drawing/2014/main" id="{92E17897-4AD9-FD74-5B36-9A6CCBAC6A3E}"/>
+              </a:ext>
+            </a:extLst>
+          </p:cNvPr>
+          <p:cNvSpPr txBox="1"/>
+          <p:nvPr/>
+        </p:nvSpPr>
+        <p:spPr>
+          <a:xfrm>
+            <a:off x="4568094" y="4512272"/>
+            <a:ext cx="1586523" cy="369332"/>
+          </a:xfrm>
+          <a:prstGeom prst="rect">
+            <a:avLst/>
+          </a:prstGeom>
+          <a:noFill/>
+        </p:spPr>
+        <p:txBody>
+          <a:bodyPr wrap="square" rtlCol="0">
+            <a:spAutoFit/>
+          </a:bodyPr>
+          <a:lstStyle/>
+          <a:p>
+            <a:r>
+              <a:rPr lang="it-IT" dirty="0"/>
+              <a:t>STOP_CONV</a:t>
+            </a:r>
+          </a:p>
+        </p:txBody>
+      </p:sp>
+      <p:sp>
+        <p:nvSpPr>
+          <p:cNvPr id="12" name="TextBox 11">
+            <a:extLst>
+              <a:ext uri="{FF2B5EF4-FFF2-40B4-BE49-F238E27FC236}">
+                <a16:creationId xmlns:a16="http://schemas.microsoft.com/office/drawing/2014/main" id="{8C785CE6-E953-0EED-4389-3D6646DEF57E}"/>
+              </a:ext>
+            </a:extLst>
+          </p:cNvPr>
+          <p:cNvSpPr txBox="1"/>
+          <p:nvPr/>
+        </p:nvSpPr>
+        <p:spPr>
+          <a:xfrm>
+            <a:off x="1805353" y="4040554"/>
+            <a:ext cx="1164492" cy="923330"/>
+          </a:xfrm>
+          <a:prstGeom prst="rect">
+            <a:avLst/>
+          </a:prstGeom>
+          <a:noFill/>
+        </p:spPr>
+        <p:txBody>
+          <a:bodyPr wrap="square" rtlCol="0">
+            <a:spAutoFit/>
+          </a:bodyPr>
+          <a:lstStyle/>
+          <a:p>
+            <a:r>
+              <a:rPr lang="it-IT" dirty="0"/>
+              <a:t>CPOL = 0</a:t>
+            </a:r>
+          </a:p>
+          <a:p>
+            <a:r>
+              <a:rPr lang="it-IT" dirty="0" err="1"/>
+              <a:t>busy</a:t>
+            </a:r>
+            <a:r>
+              <a:rPr lang="it-IT" dirty="0"/>
+              <a:t> = 0</a:t>
+            </a:r>
+          </a:p>
+          <a:p>
+            <a:r>
+              <a:rPr lang="it-IT" dirty="0" err="1"/>
+              <a:t>wait</a:t>
+            </a:r>
+            <a:endParaRPr lang="it-IT" dirty="0"/>
+          </a:p>
+        </p:txBody>
+      </p:sp>
+      <p:sp>
+        <p:nvSpPr>
+          <p:cNvPr id="13" name="TextBox 12">
+            <a:extLst>
+              <a:ext uri="{FF2B5EF4-FFF2-40B4-BE49-F238E27FC236}">
+                <a16:creationId xmlns:a16="http://schemas.microsoft.com/office/drawing/2014/main" id="{6E169714-EB40-8400-B7E3-6E70E0A6958F}"/>
+              </a:ext>
+            </a:extLst>
+          </p:cNvPr>
+          <p:cNvSpPr txBox="1"/>
+          <p:nvPr/>
+        </p:nvSpPr>
+        <p:spPr>
+          <a:xfrm>
+            <a:off x="5650523" y="2205168"/>
+            <a:ext cx="1586522" cy="923330"/>
+          </a:xfrm>
+          <a:prstGeom prst="rect">
+            <a:avLst/>
+          </a:prstGeom>
+          <a:noFill/>
+        </p:spPr>
+        <p:txBody>
+          <a:bodyPr wrap="square" rtlCol="0">
+            <a:spAutoFit/>
+          </a:bodyPr>
+          <a:lstStyle/>
+          <a:p>
+            <a:r>
+              <a:rPr lang="it-IT" dirty="0"/>
+              <a:t>CONVST = 0</a:t>
+            </a:r>
+          </a:p>
+          <a:p>
+            <a:r>
+              <a:rPr lang="it-IT" dirty="0" err="1"/>
+              <a:t>sclk</a:t>
+            </a:r>
+            <a:r>
+              <a:rPr lang="it-IT" dirty="0"/>
+              <a:t> </a:t>
+            </a:r>
+            <a:r>
+              <a:rPr lang="it-IT" dirty="0" err="1"/>
+              <a:t>leading</a:t>
+            </a:r>
+            <a:r>
+              <a:rPr lang="it-IT" dirty="0"/>
+              <a:t> </a:t>
+            </a:r>
+            <a:r>
+              <a:rPr lang="it-IT" dirty="0" err="1"/>
+              <a:t>edge</a:t>
+            </a:r>
+            <a:r>
+              <a:rPr lang="it-IT" dirty="0"/>
+              <a:t> + </a:t>
+            </a:r>
+          </a:p>
+        </p:txBody>
+      </p:sp>
+      <p:cxnSp>
+        <p:nvCxnSpPr>
+          <p:cNvPr id="15" name="Connector: Curved 14">
+            <a:extLst>
+              <a:ext uri="{FF2B5EF4-FFF2-40B4-BE49-F238E27FC236}">
+                <a16:creationId xmlns:a16="http://schemas.microsoft.com/office/drawing/2014/main" id="{8FB0CB0C-2EEC-7319-A8B3-132CF6B275C7}"/>
+              </a:ext>
+            </a:extLst>
+          </p:cNvPr>
+          <p:cNvCxnSpPr>
+            <a:stCxn id="4" idx="7"/>
+            <a:endCxn id="7" idx="1"/>
+          </p:cNvCxnSpPr>
+          <p:nvPr/>
+        </p:nvCxnSpPr>
+        <p:spPr>
+          <a:xfrm rot="5400000" flipH="1" flipV="1">
+            <a:off x="3465794" y="1115082"/>
+            <a:ext cx="1359535" cy="2548818"/>
+          </a:xfrm>
+          <a:prstGeom prst="curvedConnector2">
+            <a:avLst/>
+          </a:prstGeom>
+          <a:ln>
+            <a:solidFill>
+              <a:schemeClr val="tx1"/>
+            </a:solidFill>
+            <a:tailEnd type="triangle"/>
+          </a:ln>
+        </p:spPr>
+        <p:style>
+          <a:lnRef idx="2">
+            <a:schemeClr val="accent1"/>
+          </a:lnRef>
+          <a:fillRef idx="0">
+            <a:schemeClr val="accent1"/>
+          </a:fillRef>
+          <a:effectRef idx="1">
+            <a:schemeClr val="accent1"/>
+          </a:effectRef>
+          <a:fontRef idx="minor">
+            <a:schemeClr val="tx1"/>
+          </a:fontRef>
+        </p:style>
+      </p:cxnSp>
+    </p:spTree>
+    <p:extLst>
+      <p:ext uri="{BB962C8B-B14F-4D97-AF65-F5344CB8AC3E}">
+        <p14:creationId xmlns:p14="http://schemas.microsoft.com/office/powerpoint/2010/main" val="150120323"/>
+      </p:ext>
+    </p:extLst>
+  </p:cSld>
+  <p:clrMapOvr>
+    <a:masterClrMapping/>
+  </p:clrMapOvr>
+</p:sld>
+</file>
+
+<file path=ppt/slides/slide5.xml><?xml version="1.0" encoding="utf-8"?>
+<p:sld xmlns:a="http://schemas.openxmlformats.org/drawingml/2006/main" xmlns:r="http://schemas.openxmlformats.org/officeDocument/2006/relationships" xmlns:p="http://schemas.openxmlformats.org/presentationml/2006/main">
+  <p:cSld>
+    <p:spTree>
+      <p:nvGrpSpPr>
+        <p:cNvPr id="1" name=""/>
+        <p:cNvGrpSpPr/>
+        <p:nvPr/>
+      </p:nvGrpSpPr>
+      <p:grpSpPr>
+        <a:xfrm>
+          <a:off x="0" y="0"/>
+          <a:ext cx="0" cy="0"/>
+          <a:chOff x="0" y="0"/>
+          <a:chExt cx="0" cy="0"/>
+        </a:xfrm>
+      </p:grpSpPr>
       <p:pic>
         <p:nvPicPr>
           <p:cNvPr id="2" name="Immagine 4" descr="Immagine che contiene testo, Carattere, schermata, linea&#10;&#10;Il contenuto generato dall'IA potrebbe non essere corretto.">
@@ -8395,8 +9341,8 @@
           </a:fontRef>
         </p:style>
       </p:cxnSp>
-      <mc:AlternateContent xmlns:mc="http://schemas.openxmlformats.org/markup-compatibility/2006">
-        <mc:Choice xmlns:a14="http://schemas.microsoft.com/office/drawing/2010/main" Requires="a14">
+      <mc:AlternateContent xmlns:mc="http://schemas.openxmlformats.org/markup-compatibility/2006" xmlns:a14="http://schemas.microsoft.com/office/drawing/2010/main">
+        <mc:Choice Requires="a14">
           <p:sp>
             <p:nvSpPr>
               <p:cNvPr id="19" name="CasellaDiTesto 25">
@@ -8462,7 +9408,7 @@
             </p:txBody>
           </p:sp>
         </mc:Choice>
-        <mc:Fallback>
+        <mc:Fallback xmlns="">
           <p:sp>
             <p:nvSpPr>
               <p:cNvPr id="19" name="CasellaDiTesto 25">
@@ -8520,7 +9466,7 @@
 </p:sld>
 </file>
 
-<file path=ppt/slides/slide5.xml><?xml version="1.0" encoding="utf-8"?>
+<file path=ppt/slides/slide6.xml><?xml version="1.0" encoding="utf-8"?>
 <p:sld xmlns:a="http://schemas.openxmlformats.org/drawingml/2006/main" xmlns:r="http://schemas.openxmlformats.org/officeDocument/2006/relationships" xmlns:p="http://schemas.openxmlformats.org/presentationml/2006/main">
   <p:cSld>
     <p:spTree>
@@ -8623,7 +9569,7 @@
 </p:sld>
 </file>
 
-<file path=ppt/slides/slide6.xml><?xml version="1.0" encoding="utf-8"?>
+<file path=ppt/slides/slide7.xml><?xml version="1.0" encoding="utf-8"?>
 <p:sld xmlns:a="http://schemas.openxmlformats.org/drawingml/2006/main" xmlns:r="http://schemas.openxmlformats.org/officeDocument/2006/relationships" xmlns:p="http://schemas.openxmlformats.org/presentationml/2006/main">
   <p:cSld>
     <p:spTree>
@@ -9854,7 +10800,7 @@
 </p:sld>
 </file>
 
-<file path=ppt/slides/slide7.xml><?xml version="1.0" encoding="utf-8"?>
+<file path=ppt/slides/slide8.xml><?xml version="1.0" encoding="utf-8"?>
 <p:sld xmlns:a="http://schemas.openxmlformats.org/drawingml/2006/main" xmlns:r="http://schemas.openxmlformats.org/officeDocument/2006/relationships" xmlns:p="http://schemas.openxmlformats.org/presentationml/2006/main">
   <p:cSld>
     <p:spTree>
@@ -11472,849 +12418,6 @@
     <p:extLst>
       <p:ext uri="{BB962C8B-B14F-4D97-AF65-F5344CB8AC3E}">
         <p14:creationId xmlns:p14="http://schemas.microsoft.com/office/powerpoint/2010/main" val="1466904139"/>
-      </p:ext>
-    </p:extLst>
-  </p:cSld>
-  <p:clrMapOvr>
-    <a:masterClrMapping/>
-  </p:clrMapOvr>
-</p:sld>
-</file>
-
-<file path=ppt/slides/slide8.xml><?xml version="1.0" encoding="utf-8"?>
-<p:sld xmlns:a="http://schemas.openxmlformats.org/drawingml/2006/main" xmlns:r="http://schemas.openxmlformats.org/officeDocument/2006/relationships" xmlns:p="http://schemas.openxmlformats.org/presentationml/2006/main">
-  <p:cSld>
-    <p:spTree>
-      <p:nvGrpSpPr>
-        <p:cNvPr id="1" name=""/>
-        <p:cNvGrpSpPr/>
-        <p:nvPr/>
-      </p:nvGrpSpPr>
-      <p:grpSpPr>
-        <a:xfrm>
-          <a:off x="0" y="0"/>
-          <a:ext cx="0" cy="0"/>
-          <a:chOff x="0" y="0"/>
-          <a:chExt cx="0" cy="0"/>
-        </a:xfrm>
-      </p:grpSpPr>
-      <p:sp>
-        <p:nvSpPr>
-          <p:cNvPr id="3" name="Segnaposto contenuto 2">
-            <a:extLst>
-              <a:ext uri="{FF2B5EF4-FFF2-40B4-BE49-F238E27FC236}">
-                <a16:creationId xmlns:a16="http://schemas.microsoft.com/office/drawing/2014/main" id="{9009DF52-2D9F-59CD-EB07-A3E0513565EE}"/>
-              </a:ext>
-            </a:extLst>
-          </p:cNvPr>
-          <p:cNvSpPr>
-            <a:spLocks noGrp="1"/>
-          </p:cNvSpPr>
-          <p:nvPr>
-            <p:ph idx="1"/>
-          </p:nvPr>
-        </p:nvSpPr>
-        <p:spPr>
-          <a:xfrm>
-            <a:off x="3190568" y="4903121"/>
-            <a:ext cx="9426678" cy="661936"/>
-          </a:xfrm>
-        </p:spPr>
-        <p:txBody>
-          <a:bodyPr>
-            <a:normAutofit/>
-          </a:bodyPr>
-          <a:lstStyle/>
-          <a:p>
-            <a:pPr marL="0" indent="0">
-              <a:buNone/>
-            </a:pPr>
-            <a:r>
-              <a:rPr lang="en-US" sz="2000" dirty="0"/>
-              <a:t> decouples event processing times from acquisition times</a:t>
-            </a:r>
-            <a:endParaRPr lang="it-IT" sz="2000" dirty="0"/>
-          </a:p>
-        </p:txBody>
-      </p:sp>
-      <p:sp>
-        <p:nvSpPr>
-          <p:cNvPr id="4" name="Rettangolo 3">
-            <a:extLst>
-              <a:ext uri="{FF2B5EF4-FFF2-40B4-BE49-F238E27FC236}">
-                <a16:creationId xmlns:a16="http://schemas.microsoft.com/office/drawing/2014/main" id="{FA54C0E4-AB47-35A8-1919-2F1123CC05DD}"/>
-              </a:ext>
-            </a:extLst>
-          </p:cNvPr>
-          <p:cNvSpPr/>
-          <p:nvPr/>
-        </p:nvSpPr>
-        <p:spPr>
-          <a:xfrm>
-            <a:off x="1976284" y="3057832"/>
-            <a:ext cx="2428568" cy="1150374"/>
-          </a:xfrm>
-          <a:prstGeom prst="rect">
-            <a:avLst/>
-          </a:prstGeom>
-        </p:spPr>
-        <p:style>
-          <a:lnRef idx="2">
-            <a:schemeClr val="accent1">
-              <a:shade val="15000"/>
-            </a:schemeClr>
-          </a:lnRef>
-          <a:fillRef idx="1">
-            <a:schemeClr val="accent1"/>
-          </a:fillRef>
-          <a:effectRef idx="0">
-            <a:schemeClr val="accent1"/>
-          </a:effectRef>
-          <a:fontRef idx="minor">
-            <a:schemeClr val="lt1"/>
-          </a:fontRef>
-        </p:style>
-        <p:txBody>
-          <a:bodyPr rtlCol="0" anchor="ctr"/>
-          <a:lstStyle/>
-          <a:p>
-            <a:pPr algn="ctr"/>
-            <a:r>
-              <a:rPr lang="it-IT" dirty="0"/>
-              <a:t>Sensor</a:t>
-            </a:r>
-          </a:p>
-        </p:txBody>
-      </p:sp>
-      <p:sp>
-        <p:nvSpPr>
-          <p:cNvPr id="5" name="Rettangolo 4">
-            <a:extLst>
-              <a:ext uri="{FF2B5EF4-FFF2-40B4-BE49-F238E27FC236}">
-                <a16:creationId xmlns:a16="http://schemas.microsoft.com/office/drawing/2014/main" id="{4B56F626-590F-6999-E26E-D3B4FE4E6FE6}"/>
-              </a:ext>
-            </a:extLst>
-          </p:cNvPr>
-          <p:cNvSpPr/>
-          <p:nvPr/>
-        </p:nvSpPr>
-        <p:spPr>
-          <a:xfrm>
-            <a:off x="5358581" y="3342968"/>
-            <a:ext cx="1976284" cy="661936"/>
-          </a:xfrm>
-          <a:prstGeom prst="rect">
-            <a:avLst/>
-          </a:prstGeom>
-        </p:spPr>
-        <p:style>
-          <a:lnRef idx="2">
-            <a:schemeClr val="accent1">
-              <a:shade val="15000"/>
-            </a:schemeClr>
-          </a:lnRef>
-          <a:fillRef idx="1">
-            <a:schemeClr val="accent1"/>
-          </a:fillRef>
-          <a:effectRef idx="0">
-            <a:schemeClr val="accent1"/>
-          </a:effectRef>
-          <a:fontRef idx="minor">
-            <a:schemeClr val="lt1"/>
-          </a:fontRef>
-        </p:style>
-        <p:txBody>
-          <a:bodyPr rtlCol="0" anchor="ctr"/>
-          <a:lstStyle/>
-          <a:p>
-            <a:pPr algn="ctr"/>
-            <a:r>
-              <a:rPr lang="it-IT" dirty="0"/>
-              <a:t>FIFO</a:t>
-            </a:r>
-          </a:p>
-        </p:txBody>
-      </p:sp>
-      <p:sp>
-        <p:nvSpPr>
-          <p:cNvPr id="6" name="Bolla: nuvola 5">
-            <a:extLst>
-              <a:ext uri="{FF2B5EF4-FFF2-40B4-BE49-F238E27FC236}">
-                <a16:creationId xmlns:a16="http://schemas.microsoft.com/office/drawing/2014/main" id="{CB077203-1FFB-5428-9D30-2296EC016BFE}"/>
-              </a:ext>
-            </a:extLst>
-          </p:cNvPr>
-          <p:cNvSpPr/>
-          <p:nvPr/>
-        </p:nvSpPr>
-        <p:spPr>
-          <a:xfrm>
-            <a:off x="8445910" y="2907020"/>
-            <a:ext cx="2871020" cy="1533832"/>
-          </a:xfrm>
-          <a:prstGeom prst="cloudCallout">
-            <a:avLst/>
-          </a:prstGeom>
-        </p:spPr>
-        <p:style>
-          <a:lnRef idx="2">
-            <a:schemeClr val="accent1">
-              <a:shade val="15000"/>
-            </a:schemeClr>
-          </a:lnRef>
-          <a:fillRef idx="1">
-            <a:schemeClr val="accent1"/>
-          </a:fillRef>
-          <a:effectRef idx="0">
-            <a:schemeClr val="accent1"/>
-          </a:effectRef>
-          <a:fontRef idx="minor">
-            <a:schemeClr val="lt1"/>
-          </a:fontRef>
-        </p:style>
-        <p:txBody>
-          <a:bodyPr rtlCol="0" anchor="ctr"/>
-          <a:lstStyle/>
-          <a:p>
-            <a:pPr algn="ctr"/>
-            <a:r>
-              <a:rPr lang="it-IT" dirty="0"/>
-              <a:t>DAQ</a:t>
-            </a:r>
-          </a:p>
-        </p:txBody>
-      </p:sp>
-      <p:cxnSp>
-        <p:nvCxnSpPr>
-          <p:cNvPr id="8" name="Connettore 2 7">
-            <a:extLst>
-              <a:ext uri="{FF2B5EF4-FFF2-40B4-BE49-F238E27FC236}">
-                <a16:creationId xmlns:a16="http://schemas.microsoft.com/office/drawing/2014/main" id="{8760A1E8-1AEE-A2BA-F0FD-D99437980B3B}"/>
-              </a:ext>
-            </a:extLst>
-          </p:cNvPr>
-          <p:cNvCxnSpPr/>
-          <p:nvPr/>
-        </p:nvCxnSpPr>
-        <p:spPr>
-          <a:xfrm>
-            <a:off x="7551174" y="3673936"/>
-            <a:ext cx="707923" cy="0"/>
-          </a:xfrm>
-          <a:prstGeom prst="straightConnector1">
-            <a:avLst/>
-          </a:prstGeom>
-          <a:ln>
-            <a:tailEnd type="triangle"/>
-          </a:ln>
-        </p:spPr>
-        <p:style>
-          <a:lnRef idx="2">
-            <a:schemeClr val="accent1"/>
-          </a:lnRef>
-          <a:fillRef idx="0">
-            <a:schemeClr val="accent1"/>
-          </a:fillRef>
-          <a:effectRef idx="1">
-            <a:schemeClr val="accent1"/>
-          </a:effectRef>
-          <a:fontRef idx="minor">
-            <a:schemeClr val="tx1"/>
-          </a:fontRef>
-        </p:style>
-      </p:cxnSp>
-      <p:cxnSp>
-        <p:nvCxnSpPr>
-          <p:cNvPr id="10" name="Connettore 2 9">
-            <a:extLst>
-              <a:ext uri="{FF2B5EF4-FFF2-40B4-BE49-F238E27FC236}">
-                <a16:creationId xmlns:a16="http://schemas.microsoft.com/office/drawing/2014/main" id="{BBA34C0D-39DF-5321-0C3D-E68393B1CAD5}"/>
-              </a:ext>
-            </a:extLst>
-          </p:cNvPr>
-          <p:cNvCxnSpPr/>
-          <p:nvPr/>
-        </p:nvCxnSpPr>
-        <p:spPr>
-          <a:xfrm>
-            <a:off x="4591665" y="3633019"/>
-            <a:ext cx="619432" cy="0"/>
-          </a:xfrm>
-          <a:prstGeom prst="straightConnector1">
-            <a:avLst/>
-          </a:prstGeom>
-          <a:ln>
-            <a:tailEnd type="triangle"/>
-          </a:ln>
-        </p:spPr>
-        <p:style>
-          <a:lnRef idx="2">
-            <a:schemeClr val="accent1"/>
-          </a:lnRef>
-          <a:fillRef idx="0">
-            <a:schemeClr val="accent1"/>
-          </a:fillRef>
-          <a:effectRef idx="1">
-            <a:schemeClr val="accent1"/>
-          </a:effectRef>
-          <a:fontRef idx="minor">
-            <a:schemeClr val="tx1"/>
-          </a:fontRef>
-        </p:style>
-      </p:cxnSp>
-      <p:cxnSp>
-        <p:nvCxnSpPr>
-          <p:cNvPr id="12" name="Connettore 2 11">
-            <a:extLst>
-              <a:ext uri="{FF2B5EF4-FFF2-40B4-BE49-F238E27FC236}">
-                <a16:creationId xmlns:a16="http://schemas.microsoft.com/office/drawing/2014/main" id="{C0127EA4-D266-5347-0CFC-19CCD78AE600}"/>
-              </a:ext>
-            </a:extLst>
-          </p:cNvPr>
-          <p:cNvCxnSpPr/>
-          <p:nvPr/>
-        </p:nvCxnSpPr>
-        <p:spPr>
-          <a:xfrm>
-            <a:off x="6346723" y="4208206"/>
-            <a:ext cx="0" cy="540775"/>
-          </a:xfrm>
-          <a:prstGeom prst="straightConnector1">
-            <a:avLst/>
-          </a:prstGeom>
-          <a:ln>
-            <a:tailEnd type="triangle"/>
-          </a:ln>
-        </p:spPr>
-        <p:style>
-          <a:lnRef idx="2">
-            <a:schemeClr val="accent1"/>
-          </a:lnRef>
-          <a:fillRef idx="0">
-            <a:schemeClr val="accent1"/>
-          </a:fillRef>
-          <a:effectRef idx="1">
-            <a:schemeClr val="accent1"/>
-          </a:effectRef>
-          <a:fontRef idx="minor">
-            <a:schemeClr val="tx1"/>
-          </a:fontRef>
-        </p:style>
-      </p:cxnSp>
-      <p:sp>
-        <p:nvSpPr>
-          <p:cNvPr id="26" name="CasellaDiTesto 25">
-            <a:extLst>
-              <a:ext uri="{FF2B5EF4-FFF2-40B4-BE49-F238E27FC236}">
-                <a16:creationId xmlns:a16="http://schemas.microsoft.com/office/drawing/2014/main" id="{6FD7F477-5599-5C3F-F87C-DCD50DA33F73}"/>
-              </a:ext>
-            </a:extLst>
-          </p:cNvPr>
-          <p:cNvSpPr txBox="1"/>
-          <p:nvPr/>
-        </p:nvSpPr>
-        <p:spPr>
-          <a:xfrm>
-            <a:off x="3048000" y="923611"/>
-            <a:ext cx="6096000" cy="369332"/>
-          </a:xfrm>
-          <a:prstGeom prst="rect">
-            <a:avLst/>
-          </a:prstGeom>
-          <a:noFill/>
-        </p:spPr>
-        <p:txBody>
-          <a:bodyPr wrap="square">
-            <a:spAutoFit/>
-          </a:bodyPr>
-          <a:lstStyle/>
-          <a:p>
-            <a:r>
-              <a:rPr lang="it-IT" dirty="0"/>
-              <a:t>-FIFO EMPTY                  </a:t>
-            </a:r>
-            <a:r>
-              <a:rPr lang="it-IT" dirty="0" err="1"/>
-              <a:t>wrPtr</a:t>
-            </a:r>
-            <a:r>
-              <a:rPr lang="it-IT" dirty="0"/>
-              <a:t> = </a:t>
-            </a:r>
-            <a:r>
-              <a:rPr lang="it-IT" dirty="0" err="1"/>
-              <a:t>RdPtr</a:t>
-            </a:r>
-            <a:endParaRPr lang="it-IT" dirty="0"/>
-          </a:p>
-        </p:txBody>
-      </p:sp>
-      <p:sp>
-        <p:nvSpPr>
-          <p:cNvPr id="20" name="CasellaDiTesto 19">
-            <a:extLst>
-              <a:ext uri="{FF2B5EF4-FFF2-40B4-BE49-F238E27FC236}">
-                <a16:creationId xmlns:a16="http://schemas.microsoft.com/office/drawing/2014/main" id="{0E4913F4-84B5-E948-7EFC-EBFCE4C34758}"/>
-              </a:ext>
-            </a:extLst>
-          </p:cNvPr>
-          <p:cNvSpPr txBox="1"/>
-          <p:nvPr/>
-        </p:nvSpPr>
-        <p:spPr>
-          <a:xfrm>
-            <a:off x="3115268" y="1455734"/>
-            <a:ext cx="1289584" cy="369332"/>
-          </a:xfrm>
-          <a:prstGeom prst="rect">
-            <a:avLst/>
-          </a:prstGeom>
-          <a:noFill/>
-        </p:spPr>
-        <p:txBody>
-          <a:bodyPr wrap="none" rtlCol="0">
-            <a:spAutoFit/>
-          </a:bodyPr>
-          <a:lstStyle/>
-          <a:p>
-            <a:r>
-              <a:rPr lang="it-IT" dirty="0"/>
-              <a:t>-FIFO FULL</a:t>
-            </a:r>
-          </a:p>
-        </p:txBody>
-      </p:sp>
-      <p:cxnSp>
-        <p:nvCxnSpPr>
-          <p:cNvPr id="22" name="Connettore 2 21">
-            <a:extLst>
-              <a:ext uri="{FF2B5EF4-FFF2-40B4-BE49-F238E27FC236}">
-                <a16:creationId xmlns:a16="http://schemas.microsoft.com/office/drawing/2014/main" id="{021B5E0A-273F-6B05-8D8D-EADCA8EB6ED3}"/>
-              </a:ext>
-            </a:extLst>
-          </p:cNvPr>
-          <p:cNvCxnSpPr>
-            <a:cxnSpLocks/>
-          </p:cNvCxnSpPr>
-          <p:nvPr/>
-        </p:nvCxnSpPr>
-        <p:spPr>
-          <a:xfrm flipV="1">
-            <a:off x="6840070" y="1554300"/>
-            <a:ext cx="231738" cy="196165"/>
-          </a:xfrm>
-          <a:prstGeom prst="straightConnector1">
-            <a:avLst/>
-          </a:prstGeom>
-          <a:ln>
-            <a:tailEnd type="triangle"/>
-          </a:ln>
-        </p:spPr>
-        <p:style>
-          <a:lnRef idx="2">
-            <a:schemeClr val="dk1"/>
-          </a:lnRef>
-          <a:fillRef idx="0">
-            <a:schemeClr val="dk1"/>
-          </a:fillRef>
-          <a:effectRef idx="1">
-            <a:schemeClr val="dk1"/>
-          </a:effectRef>
-          <a:fontRef idx="minor">
-            <a:schemeClr val="tx1"/>
-          </a:fontRef>
-        </p:style>
-      </p:cxnSp>
-      <p:cxnSp>
-        <p:nvCxnSpPr>
-          <p:cNvPr id="24" name="Connettore 2 23">
-            <a:extLst>
-              <a:ext uri="{FF2B5EF4-FFF2-40B4-BE49-F238E27FC236}">
-                <a16:creationId xmlns:a16="http://schemas.microsoft.com/office/drawing/2014/main" id="{8D01AE63-BA5A-EBC6-51ED-28EB0C9C84BD}"/>
-              </a:ext>
-            </a:extLst>
-          </p:cNvPr>
-          <p:cNvCxnSpPr>
-            <a:cxnSpLocks/>
-          </p:cNvCxnSpPr>
-          <p:nvPr/>
-        </p:nvCxnSpPr>
-        <p:spPr>
-          <a:xfrm>
-            <a:off x="6840070" y="1825859"/>
-            <a:ext cx="231738" cy="166926"/>
-          </a:xfrm>
-          <a:prstGeom prst="straightConnector1">
-            <a:avLst/>
-          </a:prstGeom>
-          <a:ln>
-            <a:tailEnd type="triangle"/>
-          </a:ln>
-        </p:spPr>
-        <p:style>
-          <a:lnRef idx="2">
-            <a:schemeClr val="dk1"/>
-          </a:lnRef>
-          <a:fillRef idx="0">
-            <a:schemeClr val="dk1"/>
-          </a:fillRef>
-          <a:effectRef idx="1">
-            <a:schemeClr val="dk1"/>
-          </a:effectRef>
-          <a:fontRef idx="minor">
-            <a:schemeClr val="tx1"/>
-          </a:fontRef>
-        </p:style>
-      </p:cxnSp>
-      <p:sp>
-        <p:nvSpPr>
-          <p:cNvPr id="29" name="CasellaDiTesto 28">
-            <a:extLst>
-              <a:ext uri="{FF2B5EF4-FFF2-40B4-BE49-F238E27FC236}">
-                <a16:creationId xmlns:a16="http://schemas.microsoft.com/office/drawing/2014/main" id="{83CCE25F-6E86-DDF4-A215-C1EC08260F2A}"/>
-              </a:ext>
-            </a:extLst>
-          </p:cNvPr>
-          <p:cNvSpPr txBox="1"/>
-          <p:nvPr/>
-        </p:nvSpPr>
-        <p:spPr>
-          <a:xfrm>
-            <a:off x="5211097" y="1409135"/>
-            <a:ext cx="1575175" cy="369332"/>
-          </a:xfrm>
-          <a:prstGeom prst="rect">
-            <a:avLst/>
-          </a:prstGeom>
-          <a:noFill/>
-        </p:spPr>
-        <p:txBody>
-          <a:bodyPr wrap="none" rtlCol="0">
-            <a:spAutoFit/>
-          </a:bodyPr>
-          <a:lstStyle/>
-          <a:p>
-            <a:r>
-              <a:rPr lang="it-IT" dirty="0" err="1"/>
-              <a:t>Never</a:t>
-            </a:r>
-            <a:r>
-              <a:rPr lang="it-IT" dirty="0"/>
-              <a:t> </a:t>
-            </a:r>
-            <a:r>
-              <a:rPr lang="it-IT" dirty="0" err="1"/>
-              <a:t>happen</a:t>
-            </a:r>
-            <a:endParaRPr lang="it-IT" dirty="0"/>
-          </a:p>
-        </p:txBody>
-      </p:sp>
-      <p:cxnSp>
-        <p:nvCxnSpPr>
-          <p:cNvPr id="30" name="Connettore 2 29">
-            <a:extLst>
-              <a:ext uri="{FF2B5EF4-FFF2-40B4-BE49-F238E27FC236}">
-                <a16:creationId xmlns:a16="http://schemas.microsoft.com/office/drawing/2014/main" id="{E4AAEC09-8BC8-1043-DDD9-499EDC76512B}"/>
-              </a:ext>
-            </a:extLst>
-          </p:cNvPr>
-          <p:cNvCxnSpPr/>
-          <p:nvPr/>
-        </p:nvCxnSpPr>
-        <p:spPr>
-          <a:xfrm>
-            <a:off x="4585155" y="1715509"/>
-            <a:ext cx="403123" cy="0"/>
-          </a:xfrm>
-          <a:prstGeom prst="straightConnector1">
-            <a:avLst/>
-          </a:prstGeom>
-          <a:ln>
-            <a:tailEnd type="triangle"/>
-          </a:ln>
-        </p:spPr>
-        <p:style>
-          <a:lnRef idx="2">
-            <a:schemeClr val="dk1"/>
-          </a:lnRef>
-          <a:fillRef idx="0">
-            <a:schemeClr val="dk1"/>
-          </a:fillRef>
-          <a:effectRef idx="1">
-            <a:schemeClr val="dk1"/>
-          </a:effectRef>
-          <a:fontRef idx="minor">
-            <a:schemeClr val="tx1"/>
-          </a:fontRef>
-        </p:style>
-      </p:cxnSp>
-      <p:sp>
-        <p:nvSpPr>
-          <p:cNvPr id="35" name="CasellaDiTesto 34">
-            <a:extLst>
-              <a:ext uri="{FF2B5EF4-FFF2-40B4-BE49-F238E27FC236}">
-                <a16:creationId xmlns:a16="http://schemas.microsoft.com/office/drawing/2014/main" id="{136ADBF5-1B09-05F3-2ACD-936BA6AEB092}"/>
-              </a:ext>
-            </a:extLst>
-          </p:cNvPr>
-          <p:cNvSpPr txBox="1"/>
-          <p:nvPr/>
-        </p:nvSpPr>
-        <p:spPr>
-          <a:xfrm>
-            <a:off x="7179403" y="1358593"/>
-            <a:ext cx="2989601" cy="369332"/>
-          </a:xfrm>
-          <a:prstGeom prst="rect">
-            <a:avLst/>
-          </a:prstGeom>
-          <a:noFill/>
-        </p:spPr>
-        <p:txBody>
-          <a:bodyPr wrap="none" rtlCol="0">
-            <a:spAutoFit/>
-          </a:bodyPr>
-          <a:lstStyle/>
-          <a:p>
-            <a:r>
-              <a:rPr lang="it-IT" dirty="0"/>
-              <a:t>slow data processing speed </a:t>
-            </a:r>
-          </a:p>
-        </p:txBody>
-      </p:sp>
-      <p:sp>
-        <p:nvSpPr>
-          <p:cNvPr id="36" name="CasellaDiTesto 35">
-            <a:extLst>
-              <a:ext uri="{FF2B5EF4-FFF2-40B4-BE49-F238E27FC236}">
-                <a16:creationId xmlns:a16="http://schemas.microsoft.com/office/drawing/2014/main" id="{F6FDB645-1972-402C-7C86-AFB3447CB310}"/>
-              </a:ext>
-            </a:extLst>
-          </p:cNvPr>
-          <p:cNvSpPr txBox="1"/>
-          <p:nvPr/>
-        </p:nvSpPr>
-        <p:spPr>
-          <a:xfrm>
-            <a:off x="7179403" y="1825859"/>
-            <a:ext cx="3080202" cy="369332"/>
-          </a:xfrm>
-          <a:prstGeom prst="rect">
-            <a:avLst/>
-          </a:prstGeom>
-          <a:noFill/>
-        </p:spPr>
-        <p:txBody>
-          <a:bodyPr wrap="none" rtlCol="0">
-            <a:spAutoFit/>
-          </a:bodyPr>
-          <a:lstStyle/>
-          <a:p>
-            <a:r>
-              <a:rPr lang="en-US" dirty="0"/>
-              <a:t>incorrect sizing of depth FIFO</a:t>
-            </a:r>
-            <a:endParaRPr lang="it-IT" dirty="0"/>
-          </a:p>
-        </p:txBody>
-      </p:sp>
-      <p:sp>
-        <p:nvSpPr>
-          <p:cNvPr id="13" name="CasellaDiTesto 12">
-            <a:extLst>
-              <a:ext uri="{FF2B5EF4-FFF2-40B4-BE49-F238E27FC236}">
-                <a16:creationId xmlns:a16="http://schemas.microsoft.com/office/drawing/2014/main" id="{C92E7BEA-3E84-1F95-98E4-0476647F6A23}"/>
-              </a:ext>
-            </a:extLst>
-          </p:cNvPr>
-          <p:cNvSpPr txBox="1"/>
-          <p:nvPr/>
-        </p:nvSpPr>
-        <p:spPr>
-          <a:xfrm>
-            <a:off x="4786716" y="2228187"/>
-            <a:ext cx="949299" cy="369332"/>
-          </a:xfrm>
-          <a:prstGeom prst="rect">
-            <a:avLst/>
-          </a:prstGeom>
-          <a:noFill/>
-        </p:spPr>
-        <p:txBody>
-          <a:bodyPr wrap="none" rtlCol="0">
-            <a:spAutoFit/>
-          </a:bodyPr>
-          <a:lstStyle/>
-          <a:p>
-            <a:r>
-              <a:rPr lang="it-IT" dirty="0"/>
-              <a:t>FREEZE</a:t>
-            </a:r>
-          </a:p>
-        </p:txBody>
-      </p:sp>
-      <p:sp>
-        <p:nvSpPr>
-          <p:cNvPr id="14" name="CasellaDiTesto 13">
-            <a:extLst>
-              <a:ext uri="{FF2B5EF4-FFF2-40B4-BE49-F238E27FC236}">
-                <a16:creationId xmlns:a16="http://schemas.microsoft.com/office/drawing/2014/main" id="{CC05D9E2-38D6-AE97-DB27-841E21047094}"/>
-              </a:ext>
-            </a:extLst>
-          </p:cNvPr>
-          <p:cNvSpPr txBox="1"/>
-          <p:nvPr/>
-        </p:nvSpPr>
-        <p:spPr>
-          <a:xfrm>
-            <a:off x="5902605" y="2235119"/>
-            <a:ext cx="2106667" cy="369332"/>
-          </a:xfrm>
-          <a:prstGeom prst="rect">
-            <a:avLst/>
-          </a:prstGeom>
-          <a:noFill/>
-        </p:spPr>
-        <p:txBody>
-          <a:bodyPr wrap="none" rtlCol="0">
-            <a:spAutoFit/>
-          </a:bodyPr>
-          <a:lstStyle/>
-          <a:p>
-            <a:r>
-              <a:rPr lang="it-IT" dirty="0"/>
-              <a:t>CIRCULAR BUFFER</a:t>
-            </a:r>
-          </a:p>
-        </p:txBody>
-      </p:sp>
-      <p:cxnSp>
-        <p:nvCxnSpPr>
-          <p:cNvPr id="17" name="Connettore 2 16">
-            <a:extLst>
-              <a:ext uri="{FF2B5EF4-FFF2-40B4-BE49-F238E27FC236}">
-                <a16:creationId xmlns:a16="http://schemas.microsoft.com/office/drawing/2014/main" id="{4AADA8E7-0AEF-4E44-2154-46EDDAF5E214}"/>
-              </a:ext>
-            </a:extLst>
-          </p:cNvPr>
-          <p:cNvCxnSpPr>
-            <a:cxnSpLocks/>
-          </p:cNvCxnSpPr>
-          <p:nvPr/>
-        </p:nvCxnSpPr>
-        <p:spPr>
-          <a:xfrm>
-            <a:off x="6254189" y="1889837"/>
-            <a:ext cx="231738" cy="166926"/>
-          </a:xfrm>
-          <a:prstGeom prst="straightConnector1">
-            <a:avLst/>
-          </a:prstGeom>
-          <a:ln>
-            <a:tailEnd type="triangle"/>
-          </a:ln>
-        </p:spPr>
-        <p:style>
-          <a:lnRef idx="2">
-            <a:schemeClr val="dk1"/>
-          </a:lnRef>
-          <a:fillRef idx="0">
-            <a:schemeClr val="dk1"/>
-          </a:fillRef>
-          <a:effectRef idx="1">
-            <a:schemeClr val="dk1"/>
-          </a:effectRef>
-          <a:fontRef idx="minor">
-            <a:schemeClr val="tx1"/>
-          </a:fontRef>
-        </p:style>
-      </p:cxnSp>
-      <p:cxnSp>
-        <p:nvCxnSpPr>
-          <p:cNvPr id="21" name="Connettore 2 20">
-            <a:extLst>
-              <a:ext uri="{FF2B5EF4-FFF2-40B4-BE49-F238E27FC236}">
-                <a16:creationId xmlns:a16="http://schemas.microsoft.com/office/drawing/2014/main" id="{1D2CD553-8D75-6BD8-C5E9-55AB27DB7FE2}"/>
-              </a:ext>
-            </a:extLst>
-          </p:cNvPr>
-          <p:cNvCxnSpPr>
-            <a:cxnSpLocks/>
-          </p:cNvCxnSpPr>
-          <p:nvPr/>
-        </p:nvCxnSpPr>
-        <p:spPr>
-          <a:xfrm flipH="1">
-            <a:off x="5261365" y="1899634"/>
-            <a:ext cx="173336" cy="232759"/>
-          </a:xfrm>
-          <a:prstGeom prst="straightConnector1">
-            <a:avLst/>
-          </a:prstGeom>
-          <a:ln>
-            <a:tailEnd type="triangle"/>
-          </a:ln>
-        </p:spPr>
-        <p:style>
-          <a:lnRef idx="2">
-            <a:schemeClr val="dk1"/>
-          </a:lnRef>
-          <a:fillRef idx="0">
-            <a:schemeClr val="dk1"/>
-          </a:fillRef>
-          <a:effectRef idx="1">
-            <a:schemeClr val="dk1"/>
-          </a:effectRef>
-          <a:fontRef idx="minor">
-            <a:schemeClr val="tx1"/>
-          </a:fontRef>
-        </p:style>
-      </p:cxnSp>
-      <p:cxnSp>
-        <p:nvCxnSpPr>
-          <p:cNvPr id="15" name="Connettore 2 14">
-            <a:extLst>
-              <a:ext uri="{FF2B5EF4-FFF2-40B4-BE49-F238E27FC236}">
-                <a16:creationId xmlns:a16="http://schemas.microsoft.com/office/drawing/2014/main" id="{639961C0-3E44-6833-44ED-AE4D9051F766}"/>
-              </a:ext>
-            </a:extLst>
-          </p:cNvPr>
-          <p:cNvCxnSpPr/>
-          <p:nvPr/>
-        </p:nvCxnSpPr>
-        <p:spPr>
-          <a:xfrm>
-            <a:off x="4591665" y="1130490"/>
-            <a:ext cx="403123" cy="0"/>
-          </a:xfrm>
-          <a:prstGeom prst="straightConnector1">
-            <a:avLst/>
-          </a:prstGeom>
-          <a:ln>
-            <a:tailEnd type="triangle"/>
-          </a:ln>
-        </p:spPr>
-        <p:style>
-          <a:lnRef idx="2">
-            <a:schemeClr val="dk1"/>
-          </a:lnRef>
-          <a:fillRef idx="0">
-            <a:schemeClr val="dk1"/>
-          </a:fillRef>
-          <a:effectRef idx="1">
-            <a:schemeClr val="dk1"/>
-          </a:effectRef>
-          <a:fontRef idx="minor">
-            <a:schemeClr val="tx1"/>
-          </a:fontRef>
-        </p:style>
-      </p:cxnSp>
-    </p:spTree>
-    <p:extLst>
-      <p:ext uri="{BB962C8B-B14F-4D97-AF65-F5344CB8AC3E}">
-        <p14:creationId xmlns:p14="http://schemas.microsoft.com/office/powerpoint/2010/main" val="2654750685"/>
       </p:ext>
     </p:extLst>
   </p:cSld>
@@ -12343,44 +12446,10 @@
       </p:grpSpPr>
       <p:sp>
         <p:nvSpPr>
-          <p:cNvPr id="15" name="Titolo 1">
-            <a:extLst>
-              <a:ext uri="{FF2B5EF4-FFF2-40B4-BE49-F238E27FC236}">
-                <a16:creationId xmlns:a16="http://schemas.microsoft.com/office/drawing/2014/main" id="{5B9FDF46-F64C-7738-29B8-278248568FD9}"/>
-              </a:ext>
-            </a:extLst>
-          </p:cNvPr>
-          <p:cNvSpPr>
-            <a:spLocks noGrp="1"/>
-          </p:cNvSpPr>
-          <p:nvPr>
-            <p:ph type="title"/>
-          </p:nvPr>
-        </p:nvSpPr>
-        <p:spPr>
-          <a:xfrm>
-            <a:off x="838200" y="365125"/>
-            <a:ext cx="10515600" cy="1325563"/>
-          </a:xfrm>
-        </p:spPr>
-        <p:txBody>
-          <a:bodyPr/>
-          <a:lstStyle/>
-          <a:p>
-            <a:r>
-              <a:rPr lang="en-US" dirty="0"/>
-              <a:t>Choice of depth</a:t>
-            </a:r>
-            <a:endParaRPr lang="it-IT" dirty="0"/>
-          </a:p>
-        </p:txBody>
-      </p:sp>
-      <p:sp>
-        <p:nvSpPr>
-          <p:cNvPr id="16" name="Segnaposto contenuto 2">
-            <a:extLst>
-              <a:ext uri="{FF2B5EF4-FFF2-40B4-BE49-F238E27FC236}">
-                <a16:creationId xmlns:a16="http://schemas.microsoft.com/office/drawing/2014/main" id="{0290625A-20EA-A4AB-D8E1-9E60CD02F9D1}"/>
+          <p:cNvPr id="3" name="Segnaposto contenuto 2">
+            <a:extLst>
+              <a:ext uri="{FF2B5EF4-FFF2-40B4-BE49-F238E27FC236}">
+                <a16:creationId xmlns:a16="http://schemas.microsoft.com/office/drawing/2014/main" id="{9009DF52-2D9F-59CD-EB07-A3E0513565EE}"/>
               </a:ext>
             </a:extLst>
           </p:cNvPr>
@@ -12393,8 +12462,8 @@
         </p:nvSpPr>
         <p:spPr>
           <a:xfrm>
-            <a:off x="838200" y="1825625"/>
-            <a:ext cx="10515600" cy="4351338"/>
+            <a:off x="3190568" y="4903121"/>
+            <a:ext cx="9426678" cy="661936"/>
           </a:xfrm>
         </p:spPr>
         <p:txBody>
@@ -12408,271 +12477,270 @@
             </a:pPr>
             <a:r>
               <a:rPr lang="en-US" sz="2000" dirty="0"/>
-              <a:t>The choice of depth is a compromise between:</a:t>
-            </a:r>
-          </a:p>
-          <a:p>
-            <a:r>
-              <a:rPr lang="en-US" sz="2000" dirty="0"/>
-              <a:t>Maximum clock frequency: 100 MHz  -&gt; 1 bit 10ns -&gt; 10 bit 100ns </a:t>
-            </a:r>
-          </a:p>
-          <a:p>
-            <a:r>
-              <a:rPr lang="en-US" sz="2000" dirty="0"/>
-              <a:t>Expected average event frequency</a:t>
-            </a:r>
-          </a:p>
-          <a:p>
-            <a:r>
-              <a:rPr lang="en-US" sz="2000" dirty="0"/>
-              <a:t>Power</a:t>
+              <a:t> decouples event processing times from acquisition times</a:t>
             </a:r>
             <a:endParaRPr lang="it-IT" sz="2000" dirty="0"/>
           </a:p>
         </p:txBody>
       </p:sp>
-      <mc:AlternateContent xmlns:mc="http://schemas.openxmlformats.org/markup-compatibility/2006">
-        <mc:Choice xmlns:a14="http://schemas.microsoft.com/office/drawing/2010/main" Requires="a14">
-          <p:sp>
-            <p:nvSpPr>
-              <p:cNvPr id="17" name="CasellaDiTesto 5">
-                <a:extLst>
-                  <a:ext uri="{FF2B5EF4-FFF2-40B4-BE49-F238E27FC236}">
-                    <a16:creationId xmlns:a16="http://schemas.microsoft.com/office/drawing/2014/main" id="{177978B0-04D7-AF43-C940-DA1DD187BF66}"/>
-                  </a:ext>
-                </a:extLst>
-              </p:cNvPr>
-              <p:cNvSpPr txBox="1"/>
-              <p:nvPr/>
-            </p:nvSpPr>
-            <p:spPr>
-              <a:xfrm>
-                <a:off x="5637276" y="2971800"/>
-                <a:ext cx="2656332" cy="369332"/>
-              </a:xfrm>
-              <a:prstGeom prst="rect">
-                <a:avLst/>
-              </a:prstGeom>
-              <a:noFill/>
-            </p:spPr>
-            <p:txBody>
-              <a:bodyPr wrap="square" rtlCol="0">
-                <a:spAutoFit/>
-              </a:bodyPr>
-              <a:lstStyle/>
-              <a:p>
-                <a:r>
-                  <a:rPr lang="it-IT" dirty="0"/>
-                  <a:t> </a:t>
-                </a:r>
-                <a14:m>
-                  <m:oMath xmlns:m="http://schemas.openxmlformats.org/officeDocument/2006/math">
-                    <m:r>
-                      <a:rPr lang="it-IT" b="0" i="0" smtClean="0">
-                        <a:latin typeface="Cambria Math" panose="02040503050406030204" pitchFamily="18" charset="0"/>
-                        <a:ea typeface="Cambria Math" panose="02040503050406030204" pitchFamily="18" charset="0"/>
-                      </a:rPr>
-                      <m:t>2,3 </m:t>
-                    </m:r>
-                    <m:r>
-                      <a:rPr lang="it-IT" i="1" smtClean="0">
-                        <a:latin typeface="Cambria Math" panose="02040503050406030204" pitchFamily="18" charset="0"/>
-                        <a:ea typeface="Cambria Math" panose="02040503050406030204" pitchFamily="18" charset="0"/>
-                      </a:rPr>
-                      <m:t>𝜇</m:t>
-                    </m:r>
-                    <m:r>
-                      <a:rPr lang="it-IT" b="0" i="1" smtClean="0">
-                        <a:latin typeface="Cambria Math" panose="02040503050406030204" pitchFamily="18" charset="0"/>
-                        <a:ea typeface="Cambria Math" panose="02040503050406030204" pitchFamily="18" charset="0"/>
-                      </a:rPr>
-                      <m:t>𝑠</m:t>
-                    </m:r>
-                    <m:r>
-                      <a:rPr lang="it-IT" b="0" i="1" smtClean="0">
-                        <a:latin typeface="Cambria Math" panose="02040503050406030204" pitchFamily="18" charset="0"/>
-                        <a:ea typeface="Cambria Math" panose="02040503050406030204" pitchFamily="18" charset="0"/>
-                      </a:rPr>
-                      <m:t>=2300 </m:t>
-                    </m:r>
-                    <m:r>
-                      <a:rPr lang="it-IT" b="0" i="1" smtClean="0">
-                        <a:latin typeface="Cambria Math" panose="02040503050406030204" pitchFamily="18" charset="0"/>
-                        <a:ea typeface="Cambria Math" panose="02040503050406030204" pitchFamily="18" charset="0"/>
-                      </a:rPr>
-                      <m:t>𝑛𝑠</m:t>
-                    </m:r>
-                    <m:r>
-                      <a:rPr lang="it-IT" b="0" i="1" smtClean="0">
-                        <a:latin typeface="Cambria Math" panose="02040503050406030204" pitchFamily="18" charset="0"/>
-                        <a:ea typeface="Cambria Math" panose="02040503050406030204" pitchFamily="18" charset="0"/>
-                      </a:rPr>
-                      <m:t> </m:t>
-                    </m:r>
-                  </m:oMath>
-                </a14:m>
-                <a:endParaRPr lang="it-IT" dirty="0"/>
-              </a:p>
-            </p:txBody>
-          </p:sp>
-        </mc:Choice>
-        <mc:Fallback>
-          <p:sp>
-            <p:nvSpPr>
-              <p:cNvPr id="17" name="CasellaDiTesto 5">
-                <a:extLst>
-                  <a:ext uri="{FF2B5EF4-FFF2-40B4-BE49-F238E27FC236}">
-                    <a16:creationId xmlns:a16="http://schemas.microsoft.com/office/drawing/2014/main" id="{177978B0-04D7-AF43-C940-DA1DD187BF66}"/>
-                  </a:ext>
-                </a:extLst>
-              </p:cNvPr>
-              <p:cNvSpPr txBox="1">
-                <a:spLocks noRot="1" noChangeAspect="1" noMove="1" noResize="1" noEditPoints="1" noAdjustHandles="1" noChangeArrowheads="1" noChangeShapeType="1" noTextEdit="1"/>
-              </p:cNvSpPr>
-              <p:nvPr/>
-            </p:nvSpPr>
-            <p:spPr>
-              <a:xfrm>
-                <a:off x="5637276" y="2971800"/>
-                <a:ext cx="2656332" cy="369332"/>
-              </a:xfrm>
-              <a:prstGeom prst="rect">
-                <a:avLst/>
-              </a:prstGeom>
-              <a:blipFill>
-                <a:blip r:embed="rId2"/>
-                <a:stretch>
-                  <a:fillRect b="-3333"/>
-                </a:stretch>
-              </a:blipFill>
-            </p:spPr>
-            <p:txBody>
-              <a:bodyPr/>
-              <a:lstStyle/>
-              <a:p>
-                <a:r>
-                  <a:rPr lang="it-IT">
-                    <a:noFill/>
-                  </a:rPr>
-                  <a:t> </a:t>
-                </a:r>
-              </a:p>
-            </p:txBody>
-          </p:sp>
-        </mc:Fallback>
-      </mc:AlternateContent>
       <p:sp>
         <p:nvSpPr>
-          <p:cNvPr id="18" name="CasellaDiTesto 8">
-            <a:extLst>
-              <a:ext uri="{FF2B5EF4-FFF2-40B4-BE49-F238E27FC236}">
-                <a16:creationId xmlns:a16="http://schemas.microsoft.com/office/drawing/2014/main" id="{2F6F20CC-8EB1-B6EB-C915-82AC2F833D59}"/>
-              </a:ext>
-            </a:extLst>
-          </p:cNvPr>
-          <p:cNvSpPr txBox="1"/>
+          <p:cNvPr id="4" name="Rettangolo 3">
+            <a:extLst>
+              <a:ext uri="{FF2B5EF4-FFF2-40B4-BE49-F238E27FC236}">
+                <a16:creationId xmlns:a16="http://schemas.microsoft.com/office/drawing/2014/main" id="{FA54C0E4-AB47-35A8-1919-2F1123CC05DD}"/>
+              </a:ext>
+            </a:extLst>
+          </p:cNvPr>
+          <p:cNvSpPr/>
           <p:nvPr/>
         </p:nvSpPr>
         <p:spPr>
           <a:xfrm>
-            <a:off x="5568696" y="2582947"/>
-            <a:ext cx="3026791" cy="253916"/>
+            <a:off x="1976284" y="3057832"/>
+            <a:ext cx="2428568" cy="1150374"/>
           </a:xfrm>
           <a:prstGeom prst="rect">
             <a:avLst/>
           </a:prstGeom>
-          <a:noFill/>
-        </p:spPr>
+        </p:spPr>
+        <p:style>
+          <a:lnRef idx="2">
+            <a:schemeClr val="accent1">
+              <a:shade val="15000"/>
+            </a:schemeClr>
+          </a:lnRef>
+          <a:fillRef idx="1">
+            <a:schemeClr val="accent1"/>
+          </a:fillRef>
+          <a:effectRef idx="0">
+            <a:schemeClr val="accent1"/>
+          </a:effectRef>
+          <a:fontRef idx="minor">
+            <a:schemeClr val="lt1"/>
+          </a:fontRef>
+        </p:style>
         <p:txBody>
-          <a:bodyPr wrap="none" rtlCol="0">
-            <a:spAutoFit/>
-          </a:bodyPr>
+          <a:bodyPr rtlCol="0" anchor="ctr"/>
           <a:lstStyle/>
           <a:p>
-            <a:r>
-              <a:rPr lang="it-IT" sz="1050" dirty="0"/>
-              <a:t>Per il</a:t>
-            </a:r>
-            <a:r>
-              <a:rPr lang="it-IT" sz="1000" dirty="0"/>
-              <a:t> reset </a:t>
-            </a:r>
-            <a:r>
-              <a:rPr lang="it-IT" sz="1050" dirty="0"/>
-              <a:t>metto10 bit a zero  in esadecimale 3FF</a:t>
+            <a:pPr algn="ctr"/>
+            <a:r>
+              <a:rPr lang="it-IT" dirty="0"/>
+              <a:t>Sensor</a:t>
             </a:r>
           </a:p>
         </p:txBody>
       </p:sp>
-      <p:pic>
-        <p:nvPicPr>
-          <p:cNvPr id="19" name="Immagine 18" descr="Immagine che contiene schermata, Software multimediale, software&#10;&#10;Il contenuto generato dall'IA potrebbe non essere corretto.">
-            <a:extLst>
-              <a:ext uri="{FF2B5EF4-FFF2-40B4-BE49-F238E27FC236}">
-                <a16:creationId xmlns:a16="http://schemas.microsoft.com/office/drawing/2014/main" id="{97019BEA-026F-3564-5F0E-AF1961CDB4D9}"/>
-              </a:ext>
-            </a:extLst>
-          </p:cNvPr>
-          <p:cNvPicPr>
-            <a:picLocks noChangeAspect="1"/>
-          </p:cNvPicPr>
-          <p:nvPr/>
-        </p:nvPicPr>
-        <p:blipFill>
-          <a:blip r:embed="rId3">
-            <a:extLst>
-              <a:ext uri="{28A0092B-C50C-407E-A947-70E740481C1C}">
-                <a14:useLocalDpi xmlns:a14="http://schemas.microsoft.com/office/drawing/2010/main" val="0"/>
-              </a:ext>
-            </a:extLst>
-          </a:blip>
-          <a:stretch>
-            <a:fillRect/>
-          </a:stretch>
-        </p:blipFill>
-        <p:spPr>
-          <a:xfrm>
-            <a:off x="551688" y="3476069"/>
-            <a:ext cx="9753600" cy="3152824"/>
+      <p:sp>
+        <p:nvSpPr>
+          <p:cNvPr id="5" name="Rettangolo 4">
+            <a:extLst>
+              <a:ext uri="{FF2B5EF4-FFF2-40B4-BE49-F238E27FC236}">
+                <a16:creationId xmlns:a16="http://schemas.microsoft.com/office/drawing/2014/main" id="{4B56F626-590F-6999-E26E-D3B4FE4E6FE6}"/>
+              </a:ext>
+            </a:extLst>
+          </p:cNvPr>
+          <p:cNvSpPr/>
+          <p:nvPr/>
+        </p:nvSpPr>
+        <p:spPr>
+          <a:xfrm>
+            <a:off x="5358581" y="3342968"/>
+            <a:ext cx="1976284" cy="661936"/>
           </a:xfrm>
           <a:prstGeom prst="rect">
             <a:avLst/>
           </a:prstGeom>
         </p:spPr>
-      </p:pic>
+        <p:style>
+          <a:lnRef idx="2">
+            <a:schemeClr val="accent1">
+              <a:shade val="15000"/>
+            </a:schemeClr>
+          </a:lnRef>
+          <a:fillRef idx="1">
+            <a:schemeClr val="accent1"/>
+          </a:fillRef>
+          <a:effectRef idx="0">
+            <a:schemeClr val="accent1"/>
+          </a:effectRef>
+          <a:fontRef idx="minor">
+            <a:schemeClr val="lt1"/>
+          </a:fontRef>
+        </p:style>
+        <p:txBody>
+          <a:bodyPr rtlCol="0" anchor="ctr"/>
+          <a:lstStyle/>
+          <a:p>
+            <a:pPr algn="ctr"/>
+            <a:r>
+              <a:rPr lang="it-IT" dirty="0"/>
+              <a:t>FIFO</a:t>
+            </a:r>
+          </a:p>
+        </p:txBody>
+      </p:sp>
+      <p:sp>
+        <p:nvSpPr>
+          <p:cNvPr id="6" name="Bolla: nuvola 5">
+            <a:extLst>
+              <a:ext uri="{FF2B5EF4-FFF2-40B4-BE49-F238E27FC236}">
+                <a16:creationId xmlns:a16="http://schemas.microsoft.com/office/drawing/2014/main" id="{CB077203-1FFB-5428-9D30-2296EC016BFE}"/>
+              </a:ext>
+            </a:extLst>
+          </p:cNvPr>
+          <p:cNvSpPr/>
+          <p:nvPr/>
+        </p:nvSpPr>
+        <p:spPr>
+          <a:xfrm>
+            <a:off x="8445910" y="2907020"/>
+            <a:ext cx="2871020" cy="1533832"/>
+          </a:xfrm>
+          <a:prstGeom prst="cloudCallout">
+            <a:avLst/>
+          </a:prstGeom>
+        </p:spPr>
+        <p:style>
+          <a:lnRef idx="2">
+            <a:schemeClr val="accent1">
+              <a:shade val="15000"/>
+            </a:schemeClr>
+          </a:lnRef>
+          <a:fillRef idx="1">
+            <a:schemeClr val="accent1"/>
+          </a:fillRef>
+          <a:effectRef idx="0">
+            <a:schemeClr val="accent1"/>
+          </a:effectRef>
+          <a:fontRef idx="minor">
+            <a:schemeClr val="lt1"/>
+          </a:fontRef>
+        </p:style>
+        <p:txBody>
+          <a:bodyPr rtlCol="0" anchor="ctr"/>
+          <a:lstStyle/>
+          <a:p>
+            <a:pPr algn="ctr"/>
+            <a:r>
+              <a:rPr lang="it-IT" dirty="0"/>
+              <a:t>DAQ</a:t>
+            </a:r>
+          </a:p>
+        </p:txBody>
+      </p:sp>
       <p:cxnSp>
         <p:nvCxnSpPr>
-          <p:cNvPr id="20" name="Connettore diritto 19">
-            <a:extLst>
-              <a:ext uri="{FF2B5EF4-FFF2-40B4-BE49-F238E27FC236}">
-                <a16:creationId xmlns:a16="http://schemas.microsoft.com/office/drawing/2014/main" id="{E74BBBF4-043F-56B9-C2A7-87D55731BE36}"/>
-              </a:ext>
-            </a:extLst>
-          </p:cNvPr>
-          <p:cNvCxnSpPr>
-            <a:cxnSpLocks/>
-          </p:cNvCxnSpPr>
+          <p:cNvPr id="8" name="Connettore 2 7">
+            <a:extLst>
+              <a:ext uri="{FF2B5EF4-FFF2-40B4-BE49-F238E27FC236}">
+                <a16:creationId xmlns:a16="http://schemas.microsoft.com/office/drawing/2014/main" id="{8760A1E8-1AEE-A2BA-F0FD-D99437980B3B}"/>
+              </a:ext>
+            </a:extLst>
+          </p:cNvPr>
+          <p:cNvCxnSpPr/>
           <p:nvPr/>
         </p:nvCxnSpPr>
         <p:spPr>
           <a:xfrm>
-            <a:off x="3438607" y="4326280"/>
-            <a:ext cx="292608" cy="0"/>
-          </a:xfrm>
-          <a:prstGeom prst="line">
-            <a:avLst/>
-          </a:prstGeom>
+            <a:off x="7551174" y="3673936"/>
+            <a:ext cx="707923" cy="0"/>
+          </a:xfrm>
+          <a:prstGeom prst="straightConnector1">
+            <a:avLst/>
+          </a:prstGeom>
+          <a:ln>
+            <a:tailEnd type="triangle"/>
+          </a:ln>
         </p:spPr>
         <p:style>
           <a:lnRef idx="2">
-            <a:schemeClr val="accent5"/>
+            <a:schemeClr val="accent1"/>
           </a:lnRef>
           <a:fillRef idx="0">
-            <a:schemeClr val="accent5"/>
+            <a:schemeClr val="accent1"/>
           </a:fillRef>
           <a:effectRef idx="1">
-            <a:schemeClr val="accent5"/>
+            <a:schemeClr val="accent1"/>
+          </a:effectRef>
+          <a:fontRef idx="minor">
+            <a:schemeClr val="tx1"/>
+          </a:fontRef>
+        </p:style>
+      </p:cxnSp>
+      <p:cxnSp>
+        <p:nvCxnSpPr>
+          <p:cNvPr id="10" name="Connettore 2 9">
+            <a:extLst>
+              <a:ext uri="{FF2B5EF4-FFF2-40B4-BE49-F238E27FC236}">
+                <a16:creationId xmlns:a16="http://schemas.microsoft.com/office/drawing/2014/main" id="{BBA34C0D-39DF-5321-0C3D-E68393B1CAD5}"/>
+              </a:ext>
+            </a:extLst>
+          </p:cNvPr>
+          <p:cNvCxnSpPr/>
+          <p:nvPr/>
+        </p:nvCxnSpPr>
+        <p:spPr>
+          <a:xfrm>
+            <a:off x="4591665" y="3633019"/>
+            <a:ext cx="619432" cy="0"/>
+          </a:xfrm>
+          <a:prstGeom prst="straightConnector1">
+            <a:avLst/>
+          </a:prstGeom>
+          <a:ln>
+            <a:tailEnd type="triangle"/>
+          </a:ln>
+        </p:spPr>
+        <p:style>
+          <a:lnRef idx="2">
+            <a:schemeClr val="accent1"/>
+          </a:lnRef>
+          <a:fillRef idx="0">
+            <a:schemeClr val="accent1"/>
+          </a:fillRef>
+          <a:effectRef idx="1">
+            <a:schemeClr val="accent1"/>
+          </a:effectRef>
+          <a:fontRef idx="minor">
+            <a:schemeClr val="tx1"/>
+          </a:fontRef>
+        </p:style>
+      </p:cxnSp>
+      <p:cxnSp>
+        <p:nvCxnSpPr>
+          <p:cNvPr id="12" name="Connettore 2 11">
+            <a:extLst>
+              <a:ext uri="{FF2B5EF4-FFF2-40B4-BE49-F238E27FC236}">
+                <a16:creationId xmlns:a16="http://schemas.microsoft.com/office/drawing/2014/main" id="{C0127EA4-D266-5347-0CFC-19CCD78AE600}"/>
+              </a:ext>
+            </a:extLst>
+          </p:cNvPr>
+          <p:cNvCxnSpPr/>
+          <p:nvPr/>
+        </p:nvCxnSpPr>
+        <p:spPr>
+          <a:xfrm>
+            <a:off x="6346723" y="4208206"/>
+            <a:ext cx="0" cy="540775"/>
+          </a:xfrm>
+          <a:prstGeom prst="straightConnector1">
+            <a:avLst/>
+          </a:prstGeom>
+          <a:ln>
+            <a:tailEnd type="triangle"/>
+          </a:ln>
+        </p:spPr>
+        <p:style>
+          <a:lnRef idx="2">
+            <a:schemeClr val="accent1"/>
+          </a:lnRef>
+          <a:fillRef idx="0">
+            <a:schemeClr val="accent1"/>
+          </a:fillRef>
+          <a:effectRef idx="1">
+            <a:schemeClr val="accent1"/>
           </a:effectRef>
           <a:fontRef idx="minor">
             <a:schemeClr val="tx1"/>
@@ -12681,10 +12749,10 @@
       </p:cxnSp>
       <p:sp>
         <p:nvSpPr>
-          <p:cNvPr id="21" name="CasellaDiTesto 20">
-            <a:extLst>
-              <a:ext uri="{FF2B5EF4-FFF2-40B4-BE49-F238E27FC236}">
-                <a16:creationId xmlns:a16="http://schemas.microsoft.com/office/drawing/2014/main" id="{79188767-165B-D993-B6C9-C8317E85E542}"/>
+          <p:cNvPr id="26" name="CasellaDiTesto 25">
+            <a:extLst>
+              <a:ext uri="{FF2B5EF4-FFF2-40B4-BE49-F238E27FC236}">
+                <a16:creationId xmlns:a16="http://schemas.microsoft.com/office/drawing/2014/main" id="{6FD7F477-5599-5C3F-F87C-DCD50DA33F73}"/>
               </a:ext>
             </a:extLst>
           </p:cNvPr>
@@ -12693,8 +12761,56 @@
         </p:nvSpPr>
         <p:spPr>
           <a:xfrm>
-            <a:off x="3296641" y="4011606"/>
-            <a:ext cx="869149" cy="246221"/>
+            <a:off x="3048000" y="923611"/>
+            <a:ext cx="6096000" cy="369332"/>
+          </a:xfrm>
+          <a:prstGeom prst="rect">
+            <a:avLst/>
+          </a:prstGeom>
+          <a:noFill/>
+        </p:spPr>
+        <p:txBody>
+          <a:bodyPr wrap="square">
+            <a:spAutoFit/>
+          </a:bodyPr>
+          <a:lstStyle/>
+          <a:p>
+            <a:r>
+              <a:rPr lang="it-IT" dirty="0"/>
+              <a:t>-FIFO EMPTY                  </a:t>
+            </a:r>
+            <a:r>
+              <a:rPr lang="it-IT" dirty="0" err="1"/>
+              <a:t>wrPtr</a:t>
+            </a:r>
+            <a:r>
+              <a:rPr lang="it-IT" dirty="0"/>
+              <a:t> = </a:t>
+            </a:r>
+            <a:r>
+              <a:rPr lang="it-IT" dirty="0" err="1"/>
+              <a:t>RdPtr</a:t>
+            </a:r>
+            <a:endParaRPr lang="it-IT" dirty="0"/>
+          </a:p>
+        </p:txBody>
+      </p:sp>
+      <p:sp>
+        <p:nvSpPr>
+          <p:cNvPr id="20" name="CasellaDiTesto 19">
+            <a:extLst>
+              <a:ext uri="{FF2B5EF4-FFF2-40B4-BE49-F238E27FC236}">
+                <a16:creationId xmlns:a16="http://schemas.microsoft.com/office/drawing/2014/main" id="{0E4913F4-84B5-E948-7EFC-EBFCE4C34758}"/>
+              </a:ext>
+            </a:extLst>
+          </p:cNvPr>
+          <p:cNvSpPr txBox="1"/>
+          <p:nvPr/>
+        </p:nvSpPr>
+        <p:spPr>
+          <a:xfrm>
+            <a:off x="3115268" y="1455734"/>
+            <a:ext cx="1289584" cy="369332"/>
           </a:xfrm>
           <a:prstGeom prst="rect">
             <a:avLst/>
@@ -12708,20 +12824,443 @@
           <a:lstStyle/>
           <a:p>
             <a:r>
-              <a:rPr lang="it-IT" sz="1000" dirty="0">
-                <a:solidFill>
-                  <a:srgbClr val="FF0000"/>
-                </a:solidFill>
-              </a:rPr>
-              <a:t>2300+100ns</a:t>
+              <a:rPr lang="it-IT" dirty="0"/>
+              <a:t>-FIFO FULL</a:t>
             </a:r>
           </a:p>
         </p:txBody>
       </p:sp>
+      <p:cxnSp>
+        <p:nvCxnSpPr>
+          <p:cNvPr id="22" name="Connettore 2 21">
+            <a:extLst>
+              <a:ext uri="{FF2B5EF4-FFF2-40B4-BE49-F238E27FC236}">
+                <a16:creationId xmlns:a16="http://schemas.microsoft.com/office/drawing/2014/main" id="{021B5E0A-273F-6B05-8D8D-EADCA8EB6ED3}"/>
+              </a:ext>
+            </a:extLst>
+          </p:cNvPr>
+          <p:cNvCxnSpPr>
+            <a:cxnSpLocks/>
+          </p:cNvCxnSpPr>
+          <p:nvPr/>
+        </p:nvCxnSpPr>
+        <p:spPr>
+          <a:xfrm flipV="1">
+            <a:off x="6840070" y="1554300"/>
+            <a:ext cx="231738" cy="196165"/>
+          </a:xfrm>
+          <a:prstGeom prst="straightConnector1">
+            <a:avLst/>
+          </a:prstGeom>
+          <a:ln>
+            <a:tailEnd type="triangle"/>
+          </a:ln>
+        </p:spPr>
+        <p:style>
+          <a:lnRef idx="2">
+            <a:schemeClr val="dk1"/>
+          </a:lnRef>
+          <a:fillRef idx="0">
+            <a:schemeClr val="dk1"/>
+          </a:fillRef>
+          <a:effectRef idx="1">
+            <a:schemeClr val="dk1"/>
+          </a:effectRef>
+          <a:fontRef idx="minor">
+            <a:schemeClr val="tx1"/>
+          </a:fontRef>
+        </p:style>
+      </p:cxnSp>
+      <p:cxnSp>
+        <p:nvCxnSpPr>
+          <p:cNvPr id="24" name="Connettore 2 23">
+            <a:extLst>
+              <a:ext uri="{FF2B5EF4-FFF2-40B4-BE49-F238E27FC236}">
+                <a16:creationId xmlns:a16="http://schemas.microsoft.com/office/drawing/2014/main" id="{8D01AE63-BA5A-EBC6-51ED-28EB0C9C84BD}"/>
+              </a:ext>
+            </a:extLst>
+          </p:cNvPr>
+          <p:cNvCxnSpPr>
+            <a:cxnSpLocks/>
+          </p:cNvCxnSpPr>
+          <p:nvPr/>
+        </p:nvCxnSpPr>
+        <p:spPr>
+          <a:xfrm>
+            <a:off x="6840070" y="1825859"/>
+            <a:ext cx="231738" cy="166926"/>
+          </a:xfrm>
+          <a:prstGeom prst="straightConnector1">
+            <a:avLst/>
+          </a:prstGeom>
+          <a:ln>
+            <a:tailEnd type="triangle"/>
+          </a:ln>
+        </p:spPr>
+        <p:style>
+          <a:lnRef idx="2">
+            <a:schemeClr val="dk1"/>
+          </a:lnRef>
+          <a:fillRef idx="0">
+            <a:schemeClr val="dk1"/>
+          </a:fillRef>
+          <a:effectRef idx="1">
+            <a:schemeClr val="dk1"/>
+          </a:effectRef>
+          <a:fontRef idx="minor">
+            <a:schemeClr val="tx1"/>
+          </a:fontRef>
+        </p:style>
+      </p:cxnSp>
+      <p:sp>
+        <p:nvSpPr>
+          <p:cNvPr id="29" name="CasellaDiTesto 28">
+            <a:extLst>
+              <a:ext uri="{FF2B5EF4-FFF2-40B4-BE49-F238E27FC236}">
+                <a16:creationId xmlns:a16="http://schemas.microsoft.com/office/drawing/2014/main" id="{83CCE25F-6E86-DDF4-A215-C1EC08260F2A}"/>
+              </a:ext>
+            </a:extLst>
+          </p:cNvPr>
+          <p:cNvSpPr txBox="1"/>
+          <p:nvPr/>
+        </p:nvSpPr>
+        <p:spPr>
+          <a:xfrm>
+            <a:off x="5211097" y="1409135"/>
+            <a:ext cx="1575175" cy="369332"/>
+          </a:xfrm>
+          <a:prstGeom prst="rect">
+            <a:avLst/>
+          </a:prstGeom>
+          <a:noFill/>
+        </p:spPr>
+        <p:txBody>
+          <a:bodyPr wrap="none" rtlCol="0">
+            <a:spAutoFit/>
+          </a:bodyPr>
+          <a:lstStyle/>
+          <a:p>
+            <a:r>
+              <a:rPr lang="it-IT" dirty="0" err="1"/>
+              <a:t>Never</a:t>
+            </a:r>
+            <a:r>
+              <a:rPr lang="it-IT" dirty="0"/>
+              <a:t> </a:t>
+            </a:r>
+            <a:r>
+              <a:rPr lang="it-IT" dirty="0" err="1"/>
+              <a:t>happen</a:t>
+            </a:r>
+            <a:endParaRPr lang="it-IT" dirty="0"/>
+          </a:p>
+        </p:txBody>
+      </p:sp>
+      <p:cxnSp>
+        <p:nvCxnSpPr>
+          <p:cNvPr id="30" name="Connettore 2 29">
+            <a:extLst>
+              <a:ext uri="{FF2B5EF4-FFF2-40B4-BE49-F238E27FC236}">
+                <a16:creationId xmlns:a16="http://schemas.microsoft.com/office/drawing/2014/main" id="{E4AAEC09-8BC8-1043-DDD9-499EDC76512B}"/>
+              </a:ext>
+            </a:extLst>
+          </p:cNvPr>
+          <p:cNvCxnSpPr/>
+          <p:nvPr/>
+        </p:nvCxnSpPr>
+        <p:spPr>
+          <a:xfrm>
+            <a:off x="4585155" y="1715509"/>
+            <a:ext cx="403123" cy="0"/>
+          </a:xfrm>
+          <a:prstGeom prst="straightConnector1">
+            <a:avLst/>
+          </a:prstGeom>
+          <a:ln>
+            <a:tailEnd type="triangle"/>
+          </a:ln>
+        </p:spPr>
+        <p:style>
+          <a:lnRef idx="2">
+            <a:schemeClr val="dk1"/>
+          </a:lnRef>
+          <a:fillRef idx="0">
+            <a:schemeClr val="dk1"/>
+          </a:fillRef>
+          <a:effectRef idx="1">
+            <a:schemeClr val="dk1"/>
+          </a:effectRef>
+          <a:fontRef idx="minor">
+            <a:schemeClr val="tx1"/>
+          </a:fontRef>
+        </p:style>
+      </p:cxnSp>
+      <p:sp>
+        <p:nvSpPr>
+          <p:cNvPr id="35" name="CasellaDiTesto 34">
+            <a:extLst>
+              <a:ext uri="{FF2B5EF4-FFF2-40B4-BE49-F238E27FC236}">
+                <a16:creationId xmlns:a16="http://schemas.microsoft.com/office/drawing/2014/main" id="{136ADBF5-1B09-05F3-2ACD-936BA6AEB092}"/>
+              </a:ext>
+            </a:extLst>
+          </p:cNvPr>
+          <p:cNvSpPr txBox="1"/>
+          <p:nvPr/>
+        </p:nvSpPr>
+        <p:spPr>
+          <a:xfrm>
+            <a:off x="7179403" y="1358593"/>
+            <a:ext cx="2989601" cy="369332"/>
+          </a:xfrm>
+          <a:prstGeom prst="rect">
+            <a:avLst/>
+          </a:prstGeom>
+          <a:noFill/>
+        </p:spPr>
+        <p:txBody>
+          <a:bodyPr wrap="none" rtlCol="0">
+            <a:spAutoFit/>
+          </a:bodyPr>
+          <a:lstStyle/>
+          <a:p>
+            <a:r>
+              <a:rPr lang="it-IT" dirty="0"/>
+              <a:t>slow data processing speed </a:t>
+            </a:r>
+          </a:p>
+        </p:txBody>
+      </p:sp>
+      <p:sp>
+        <p:nvSpPr>
+          <p:cNvPr id="36" name="CasellaDiTesto 35">
+            <a:extLst>
+              <a:ext uri="{FF2B5EF4-FFF2-40B4-BE49-F238E27FC236}">
+                <a16:creationId xmlns:a16="http://schemas.microsoft.com/office/drawing/2014/main" id="{F6FDB645-1972-402C-7C86-AFB3447CB310}"/>
+              </a:ext>
+            </a:extLst>
+          </p:cNvPr>
+          <p:cNvSpPr txBox="1"/>
+          <p:nvPr/>
+        </p:nvSpPr>
+        <p:spPr>
+          <a:xfrm>
+            <a:off x="7179403" y="1825859"/>
+            <a:ext cx="3080202" cy="369332"/>
+          </a:xfrm>
+          <a:prstGeom prst="rect">
+            <a:avLst/>
+          </a:prstGeom>
+          <a:noFill/>
+        </p:spPr>
+        <p:txBody>
+          <a:bodyPr wrap="none" rtlCol="0">
+            <a:spAutoFit/>
+          </a:bodyPr>
+          <a:lstStyle/>
+          <a:p>
+            <a:r>
+              <a:rPr lang="en-US" dirty="0"/>
+              <a:t>incorrect sizing of depth FIFO</a:t>
+            </a:r>
+            <a:endParaRPr lang="it-IT" dirty="0"/>
+          </a:p>
+        </p:txBody>
+      </p:sp>
+      <p:sp>
+        <p:nvSpPr>
+          <p:cNvPr id="13" name="CasellaDiTesto 12">
+            <a:extLst>
+              <a:ext uri="{FF2B5EF4-FFF2-40B4-BE49-F238E27FC236}">
+                <a16:creationId xmlns:a16="http://schemas.microsoft.com/office/drawing/2014/main" id="{C92E7BEA-3E84-1F95-98E4-0476647F6A23}"/>
+              </a:ext>
+            </a:extLst>
+          </p:cNvPr>
+          <p:cNvSpPr txBox="1"/>
+          <p:nvPr/>
+        </p:nvSpPr>
+        <p:spPr>
+          <a:xfrm>
+            <a:off x="4786716" y="2228187"/>
+            <a:ext cx="949299" cy="369332"/>
+          </a:xfrm>
+          <a:prstGeom prst="rect">
+            <a:avLst/>
+          </a:prstGeom>
+          <a:noFill/>
+        </p:spPr>
+        <p:txBody>
+          <a:bodyPr wrap="none" rtlCol="0">
+            <a:spAutoFit/>
+          </a:bodyPr>
+          <a:lstStyle/>
+          <a:p>
+            <a:r>
+              <a:rPr lang="it-IT" dirty="0"/>
+              <a:t>FREEZE</a:t>
+            </a:r>
+          </a:p>
+        </p:txBody>
+      </p:sp>
+      <p:sp>
+        <p:nvSpPr>
+          <p:cNvPr id="14" name="CasellaDiTesto 13">
+            <a:extLst>
+              <a:ext uri="{FF2B5EF4-FFF2-40B4-BE49-F238E27FC236}">
+                <a16:creationId xmlns:a16="http://schemas.microsoft.com/office/drawing/2014/main" id="{CC05D9E2-38D6-AE97-DB27-841E21047094}"/>
+              </a:ext>
+            </a:extLst>
+          </p:cNvPr>
+          <p:cNvSpPr txBox="1"/>
+          <p:nvPr/>
+        </p:nvSpPr>
+        <p:spPr>
+          <a:xfrm>
+            <a:off x="5902605" y="2235119"/>
+            <a:ext cx="2106667" cy="369332"/>
+          </a:xfrm>
+          <a:prstGeom prst="rect">
+            <a:avLst/>
+          </a:prstGeom>
+          <a:noFill/>
+        </p:spPr>
+        <p:txBody>
+          <a:bodyPr wrap="none" rtlCol="0">
+            <a:spAutoFit/>
+          </a:bodyPr>
+          <a:lstStyle/>
+          <a:p>
+            <a:r>
+              <a:rPr lang="it-IT" dirty="0"/>
+              <a:t>CIRCULAR BUFFER</a:t>
+            </a:r>
+          </a:p>
+        </p:txBody>
+      </p:sp>
+      <p:cxnSp>
+        <p:nvCxnSpPr>
+          <p:cNvPr id="17" name="Connettore 2 16">
+            <a:extLst>
+              <a:ext uri="{FF2B5EF4-FFF2-40B4-BE49-F238E27FC236}">
+                <a16:creationId xmlns:a16="http://schemas.microsoft.com/office/drawing/2014/main" id="{4AADA8E7-0AEF-4E44-2154-46EDDAF5E214}"/>
+              </a:ext>
+            </a:extLst>
+          </p:cNvPr>
+          <p:cNvCxnSpPr>
+            <a:cxnSpLocks/>
+          </p:cNvCxnSpPr>
+          <p:nvPr/>
+        </p:nvCxnSpPr>
+        <p:spPr>
+          <a:xfrm>
+            <a:off x="6254189" y="1889837"/>
+            <a:ext cx="231738" cy="166926"/>
+          </a:xfrm>
+          <a:prstGeom prst="straightConnector1">
+            <a:avLst/>
+          </a:prstGeom>
+          <a:ln>
+            <a:tailEnd type="triangle"/>
+          </a:ln>
+        </p:spPr>
+        <p:style>
+          <a:lnRef idx="2">
+            <a:schemeClr val="dk1"/>
+          </a:lnRef>
+          <a:fillRef idx="0">
+            <a:schemeClr val="dk1"/>
+          </a:fillRef>
+          <a:effectRef idx="1">
+            <a:schemeClr val="dk1"/>
+          </a:effectRef>
+          <a:fontRef idx="minor">
+            <a:schemeClr val="tx1"/>
+          </a:fontRef>
+        </p:style>
+      </p:cxnSp>
+      <p:cxnSp>
+        <p:nvCxnSpPr>
+          <p:cNvPr id="21" name="Connettore 2 20">
+            <a:extLst>
+              <a:ext uri="{FF2B5EF4-FFF2-40B4-BE49-F238E27FC236}">
+                <a16:creationId xmlns:a16="http://schemas.microsoft.com/office/drawing/2014/main" id="{1D2CD553-8D75-6BD8-C5E9-55AB27DB7FE2}"/>
+              </a:ext>
+            </a:extLst>
+          </p:cNvPr>
+          <p:cNvCxnSpPr>
+            <a:cxnSpLocks/>
+          </p:cNvCxnSpPr>
+          <p:nvPr/>
+        </p:nvCxnSpPr>
+        <p:spPr>
+          <a:xfrm flipH="1">
+            <a:off x="5261365" y="1899634"/>
+            <a:ext cx="173336" cy="232759"/>
+          </a:xfrm>
+          <a:prstGeom prst="straightConnector1">
+            <a:avLst/>
+          </a:prstGeom>
+          <a:ln>
+            <a:tailEnd type="triangle"/>
+          </a:ln>
+        </p:spPr>
+        <p:style>
+          <a:lnRef idx="2">
+            <a:schemeClr val="dk1"/>
+          </a:lnRef>
+          <a:fillRef idx="0">
+            <a:schemeClr val="dk1"/>
+          </a:fillRef>
+          <a:effectRef idx="1">
+            <a:schemeClr val="dk1"/>
+          </a:effectRef>
+          <a:fontRef idx="minor">
+            <a:schemeClr val="tx1"/>
+          </a:fontRef>
+        </p:style>
+      </p:cxnSp>
+      <p:cxnSp>
+        <p:nvCxnSpPr>
+          <p:cNvPr id="15" name="Connettore 2 14">
+            <a:extLst>
+              <a:ext uri="{FF2B5EF4-FFF2-40B4-BE49-F238E27FC236}">
+                <a16:creationId xmlns:a16="http://schemas.microsoft.com/office/drawing/2014/main" id="{639961C0-3E44-6833-44ED-AE4D9051F766}"/>
+              </a:ext>
+            </a:extLst>
+          </p:cNvPr>
+          <p:cNvCxnSpPr/>
+          <p:nvPr/>
+        </p:nvCxnSpPr>
+        <p:spPr>
+          <a:xfrm>
+            <a:off x="4591665" y="1130490"/>
+            <a:ext cx="403123" cy="0"/>
+          </a:xfrm>
+          <a:prstGeom prst="straightConnector1">
+            <a:avLst/>
+          </a:prstGeom>
+          <a:ln>
+            <a:tailEnd type="triangle"/>
+          </a:ln>
+        </p:spPr>
+        <p:style>
+          <a:lnRef idx="2">
+            <a:schemeClr val="dk1"/>
+          </a:lnRef>
+          <a:fillRef idx="0">
+            <a:schemeClr val="dk1"/>
+          </a:fillRef>
+          <a:effectRef idx="1">
+            <a:schemeClr val="dk1"/>
+          </a:effectRef>
+          <a:fontRef idx="minor">
+            <a:schemeClr val="tx1"/>
+          </a:fontRef>
+        </p:style>
+      </p:cxnSp>
     </p:spTree>
     <p:extLst>
       <p:ext uri="{BB962C8B-B14F-4D97-AF65-F5344CB8AC3E}">
-        <p14:creationId xmlns:p14="http://schemas.microsoft.com/office/powerpoint/2010/main" val="1329315143"/>
+        <p14:creationId xmlns:p14="http://schemas.microsoft.com/office/powerpoint/2010/main" val="2654750685"/>
       </p:ext>
     </p:extLst>
   </p:cSld>

</xml_diff>